<commit_message>
editing 2 and 3
</commit_message>
<xml_diff>
--- a/paper/figures/examples.pptx
+++ b/paper/figures/examples.pptx
@@ -10014,185 +10014,6 @@
           <a:chExt cx="0" cy="0"/>
         </a:xfrm>
       </p:grpSpPr>
-      <p:sp>
-        <p:nvSpPr>
-          <p:cNvPr id="4" name="Title 1"/>
-          <p:cNvSpPr txBox="1">
-            <a:spLocks/>
-          </p:cNvSpPr>
-          <p:nvPr/>
-        </p:nvSpPr>
-        <p:spPr>
-          <a:xfrm>
-            <a:off x="-7637" y="-44719"/>
-            <a:ext cx="6007995" cy="852891"/>
-          </a:xfrm>
-          <a:prstGeom prst="rect">
-            <a:avLst/>
-          </a:prstGeom>
-        </p:spPr>
-        <p:txBody>
-          <a:bodyPr vert="horz" lIns="91440" tIns="45720" rIns="91440" bIns="45720" rtlCol="0" anchor="b">
-            <a:normAutofit/>
-          </a:bodyPr>
-          <a:lstStyle>
-            <a:lvl1pPr algn="ctr" defTabSz="914400" rtl="0" eaLnBrk="1" latinLnBrk="0" hangingPunct="1">
-              <a:lnSpc>
-                <a:spcPct val="90000"/>
-              </a:lnSpc>
-              <a:spcBef>
-                <a:spcPct val="0"/>
-              </a:spcBef>
-              <a:buNone/>
-              <a:defRPr sz="6000" kern="1200">
-                <a:solidFill>
-                  <a:schemeClr val="tx1"/>
-                </a:solidFill>
-                <a:latin typeface="+mj-lt"/>
-                <a:ea typeface="+mj-ea"/>
-                <a:cs typeface="+mj-cs"/>
-              </a:defRPr>
-            </a:lvl1pPr>
-          </a:lstStyle>
-          <a:p>
-            <a:pPr algn="l"/>
-            <a:r>
-              <a:rPr lang="en-US" sz="4000" dirty="0" smtClean="0">
-                <a:solidFill>
-                  <a:schemeClr val="accent1">
-                    <a:lumMod val="50000"/>
-                  </a:schemeClr>
-                </a:solidFill>
-              </a:rPr>
-              <a:t>Example 1</a:t>
-            </a:r>
-            <a:endParaRPr lang="en-US" sz="4000" dirty="0">
-              <a:solidFill>
-                <a:schemeClr val="accent1">
-                  <a:lumMod val="50000"/>
-                </a:schemeClr>
-              </a:solidFill>
-            </a:endParaRPr>
-          </a:p>
-        </p:txBody>
-      </p:sp>
-      <p:sp>
-        <p:nvSpPr>
-          <p:cNvPr id="6" name="TextBox 5"/>
-          <p:cNvSpPr txBox="1"/>
-          <p:nvPr/>
-        </p:nvSpPr>
-        <p:spPr>
-          <a:xfrm>
-            <a:off x="6422571" y="1114885"/>
-            <a:ext cx="5131405" cy="2031325"/>
-          </a:xfrm>
-          <a:prstGeom prst="rect">
-            <a:avLst/>
-          </a:prstGeom>
-          <a:noFill/>
-        </p:spPr>
-        <p:txBody>
-          <a:bodyPr wrap="none" rtlCol="0">
-            <a:spAutoFit/>
-          </a:bodyPr>
-          <a:lstStyle/>
-          <a:p>
-            <a:r>
-              <a:rPr lang="en-US" b="1" dirty="0" smtClean="0"/>
-              <a:t>Requirements:</a:t>
-            </a:r>
-          </a:p>
-          <a:p>
-            <a:pPr marL="342900" indent="-342900">
-              <a:buFont typeface="+mj-lt"/>
-              <a:buAutoNum type="arabicPeriod"/>
-            </a:pPr>
-            <a:r>
-              <a:rPr lang="en-US" dirty="0" smtClean="0"/>
-              <a:t>For </a:t>
-            </a:r>
-            <a:r>
-              <a:rPr lang="en-US" dirty="0" smtClean="0"/>
-              <a:t>C1 </a:t>
-            </a:r>
-            <a:r>
-              <a:rPr lang="en-US" dirty="0" smtClean="0"/>
-              <a:t>prefixes, prefer R1 to R2 </a:t>
-            </a:r>
-          </a:p>
-          <a:p>
-            <a:pPr marL="342900" indent="-342900">
-              <a:buFont typeface="+mj-lt"/>
-              <a:buAutoNum type="arabicPeriod"/>
-            </a:pPr>
-            <a:r>
-              <a:rPr lang="en-US" dirty="0" smtClean="0"/>
-              <a:t>For </a:t>
-            </a:r>
-            <a:r>
-              <a:rPr lang="en-US" dirty="0" smtClean="0"/>
-              <a:t>C2 </a:t>
-            </a:r>
-            <a:r>
-              <a:rPr lang="en-US" dirty="0" smtClean="0"/>
-              <a:t>prefixes, prefer R3 to R4</a:t>
-            </a:r>
-          </a:p>
-          <a:p>
-            <a:pPr marL="342900" indent="-342900">
-              <a:buFont typeface="+mj-lt"/>
-              <a:buAutoNum type="arabicPeriod"/>
-            </a:pPr>
-            <a:r>
-              <a:rPr lang="en-US" dirty="0" smtClean="0"/>
-              <a:t>For ISP prefixes, prefer certain links</a:t>
-            </a:r>
-          </a:p>
-          <a:p>
-            <a:pPr marL="342900" indent="-342900">
-              <a:buFont typeface="+mj-lt"/>
-              <a:buAutoNum type="arabicPeriod"/>
-            </a:pPr>
-            <a:r>
-              <a:rPr lang="en-US" dirty="0" smtClean="0"/>
-              <a:t>For other prefixes, prefer </a:t>
-            </a:r>
-            <a:r>
-              <a:rPr lang="en-US" dirty="0" err="1" smtClean="0"/>
-              <a:t>Cust</a:t>
-            </a:r>
-            <a:r>
-              <a:rPr lang="en-US" dirty="0" smtClean="0"/>
-              <a:t> -&gt; Peer -&gt; Paid</a:t>
-            </a:r>
-          </a:p>
-          <a:p>
-            <a:pPr marL="342900" indent="-342900">
-              <a:buFont typeface="+mj-lt"/>
-              <a:buAutoNum type="arabicPeriod"/>
-            </a:pPr>
-            <a:r>
-              <a:rPr lang="en-US" dirty="0" smtClean="0"/>
-              <a:t>Always disallow transit traffic</a:t>
-            </a:r>
-          </a:p>
-          <a:p>
-            <a:pPr marL="342900" indent="-342900">
-              <a:buFont typeface="+mj-lt"/>
-              <a:buAutoNum type="arabicPeriod"/>
-            </a:pPr>
-            <a:r>
-              <a:rPr lang="en-US" dirty="0" smtClean="0"/>
-              <a:t>Aggregate X’s prefix block as p0 to external worl</a:t>
-            </a:r>
-            <a:r>
-              <a:rPr lang="en-US" dirty="0"/>
-              <a:t>d</a:t>
-            </a:r>
-          </a:p>
-        </p:txBody>
-      </p:sp>
       <p:grpSp>
         <p:nvGrpSpPr>
           <p:cNvPr id="46" name="Group 45"/>
@@ -10201,10 +10022,10 @@
         </p:nvGrpSpPr>
         <p:grpSpPr>
           <a:xfrm>
-            <a:off x="220453" y="1938068"/>
-            <a:ext cx="6620184" cy="3492814"/>
-            <a:chOff x="2268954" y="1890251"/>
-            <a:chExt cx="7626161" cy="3802978"/>
+            <a:off x="1275794" y="1863287"/>
+            <a:ext cx="4108330" cy="2845552"/>
+            <a:chOff x="3505679" y="1934664"/>
+            <a:chExt cx="5345484" cy="3098239"/>
           </a:xfrm>
         </p:grpSpPr>
         <p:grpSp>
@@ -10215,12 +10036,49 @@
           </p:nvGrpSpPr>
           <p:grpSpPr>
             <a:xfrm>
-              <a:off x="2268954" y="1890251"/>
-              <a:ext cx="7626161" cy="3802978"/>
-              <a:chOff x="1318993" y="2184165"/>
-              <a:chExt cx="9465780" cy="4474737"/>
+              <a:off x="3505679" y="1934664"/>
+              <a:ext cx="5345484" cy="3098239"/>
+              <a:chOff x="2854046" y="2236423"/>
+              <a:chExt cx="6634947" cy="3645513"/>
             </a:xfrm>
           </p:grpSpPr>
+          <p:cxnSp>
+            <p:nvCxnSpPr>
+              <p:cNvPr id="77" name="Straight Connector 76"/>
+              <p:cNvCxnSpPr>
+                <a:stCxn id="97" idx="7"/>
+              </p:cNvCxnSpPr>
+              <p:nvPr/>
+            </p:nvCxnSpPr>
+            <p:spPr>
+              <a:xfrm flipV="1">
+                <a:off x="7562694" y="3350205"/>
+                <a:ext cx="422393" cy="674946"/>
+              </a:xfrm>
+              <a:prstGeom prst="line">
+                <a:avLst/>
+              </a:prstGeom>
+              <a:ln w="28575">
+                <a:solidFill>
+                  <a:schemeClr val="tx1"/>
+                </a:solidFill>
+              </a:ln>
+            </p:spPr>
+            <p:style>
+              <a:lnRef idx="1">
+                <a:schemeClr val="accent1"/>
+              </a:lnRef>
+              <a:fillRef idx="0">
+                <a:schemeClr val="accent1"/>
+              </a:fillRef>
+              <a:effectRef idx="0">
+                <a:schemeClr val="accent1"/>
+              </a:effectRef>
+              <a:fontRef idx="minor">
+                <a:schemeClr val="tx1"/>
+              </a:fontRef>
+            </p:style>
+          </p:cxnSp>
           <p:grpSp>
             <p:nvGrpSpPr>
               <p:cNvPr id="64" name="Group 63"/>
@@ -10229,295 +10087,31 @@
             </p:nvGrpSpPr>
             <p:grpSpPr>
               <a:xfrm>
-                <a:off x="3695524" y="3765127"/>
-                <a:ext cx="4712717" cy="2116807"/>
-                <a:chOff x="4187205" y="4415318"/>
-                <a:chExt cx="4712717" cy="2116807"/>
+                <a:off x="3695524" y="3864285"/>
+                <a:ext cx="4747935" cy="2017651"/>
+                <a:chOff x="4187205" y="4514476"/>
+                <a:chExt cx="4747935" cy="2017651"/>
               </a:xfrm>
             </p:grpSpPr>
-            <p:grpSp>
-              <p:nvGrpSpPr>
-                <p:cNvPr id="90" name="Group 89"/>
-                <p:cNvGrpSpPr/>
-                <p:nvPr/>
-              </p:nvGrpSpPr>
-              <p:grpSpPr>
-                <a:xfrm>
-                  <a:off x="4187206" y="4514473"/>
-                  <a:ext cx="4712716" cy="2017652"/>
-                  <a:chOff x="3644000" y="4410076"/>
-                  <a:chExt cx="4712716" cy="2017652"/>
-                </a:xfrm>
-              </p:grpSpPr>
-              <p:sp>
-                <p:nvSpPr>
-                  <p:cNvPr id="98" name="Oval 97"/>
-                  <p:cNvSpPr/>
-                  <p:nvPr/>
-                </p:nvSpPr>
-                <p:spPr>
-                  <a:xfrm>
-                    <a:off x="3644000" y="4410076"/>
-                    <a:ext cx="4712716" cy="2017652"/>
-                  </a:xfrm>
-                  <a:prstGeom prst="ellipse">
-                    <a:avLst/>
-                  </a:prstGeom>
-                  <a:solidFill>
-                    <a:schemeClr val="accent4">
-                      <a:lumMod val="20000"/>
-                      <a:lumOff val="80000"/>
-                    </a:schemeClr>
-                  </a:solidFill>
-                  <a:ln>
-                    <a:solidFill>
-                      <a:schemeClr val="tx1">
-                        <a:lumMod val="85000"/>
-                        <a:lumOff val="15000"/>
-                      </a:schemeClr>
-                    </a:solidFill>
-                  </a:ln>
-                </p:spPr>
-                <p:style>
-                  <a:lnRef idx="2">
-                    <a:schemeClr val="accent1">
-                      <a:shade val="50000"/>
-                    </a:schemeClr>
-                  </a:lnRef>
-                  <a:fillRef idx="1">
-                    <a:schemeClr val="accent1"/>
-                  </a:fillRef>
-                  <a:effectRef idx="0">
-                    <a:schemeClr val="accent1"/>
-                  </a:effectRef>
-                  <a:fontRef idx="minor">
-                    <a:schemeClr val="lt1"/>
-                  </a:fontRef>
-                </p:style>
-                <p:txBody>
-                  <a:bodyPr rtlCol="0" anchor="ctr"/>
-                  <a:lstStyle/>
-                  <a:p>
-                    <a:pPr algn="ctr"/>
-                    <a:endParaRPr lang="en-US" sz="2000"/>
-                  </a:p>
-                </p:txBody>
-              </p:sp>
-              <p:sp>
-                <p:nvSpPr>
-                  <p:cNvPr id="99" name="Content Placeholder 2"/>
-                  <p:cNvSpPr txBox="1">
-                    <a:spLocks/>
-                  </p:cNvSpPr>
-                  <p:nvPr/>
-                </p:nvSpPr>
-                <p:spPr>
-                  <a:xfrm>
-                    <a:off x="5484272" y="5187617"/>
-                    <a:ext cx="1032171" cy="462570"/>
-                  </a:xfrm>
-                  <a:prstGeom prst="rect">
-                    <a:avLst/>
-                  </a:prstGeom>
-                </p:spPr>
-                <p:txBody>
-                  <a:bodyPr vert="horz" lIns="91440" tIns="45720" rIns="91440" bIns="45720" rtlCol="0">
-                    <a:normAutofit lnSpcReduction="10000"/>
-                  </a:bodyPr>
-                  <a:lstStyle>
-                    <a:lvl1pPr marL="228600" indent="-228600" algn="l" defTabSz="914400" rtl="0" eaLnBrk="1" latinLnBrk="0" hangingPunct="1">
-                      <a:lnSpc>
-                        <a:spcPct val="90000"/>
-                      </a:lnSpc>
-                      <a:spcBef>
-                        <a:spcPts val="1000"/>
-                      </a:spcBef>
-                      <a:buFont typeface="Arial" panose="020B0604020202020204" pitchFamily="34" charset="0"/>
-                      <a:buChar char="•"/>
-                      <a:defRPr sz="2800" kern="1200">
-                        <a:solidFill>
-                          <a:schemeClr val="tx1"/>
-                        </a:solidFill>
-                        <a:latin typeface="+mn-lt"/>
-                        <a:ea typeface="+mn-ea"/>
-                        <a:cs typeface="+mn-cs"/>
-                      </a:defRPr>
-                    </a:lvl1pPr>
-                    <a:lvl2pPr marL="685800" indent="-228600" algn="l" defTabSz="914400" rtl="0" eaLnBrk="1" latinLnBrk="0" hangingPunct="1">
-                      <a:lnSpc>
-                        <a:spcPct val="90000"/>
-                      </a:lnSpc>
-                      <a:spcBef>
-                        <a:spcPts val="500"/>
-                      </a:spcBef>
-                      <a:buFont typeface="Arial" panose="020B0604020202020204" pitchFamily="34" charset="0"/>
-                      <a:buChar char="•"/>
-                      <a:defRPr sz="2400" kern="1200">
-                        <a:solidFill>
-                          <a:schemeClr val="tx1"/>
-                        </a:solidFill>
-                        <a:latin typeface="+mn-lt"/>
-                        <a:ea typeface="+mn-ea"/>
-                        <a:cs typeface="+mn-cs"/>
-                      </a:defRPr>
-                    </a:lvl2pPr>
-                    <a:lvl3pPr marL="1143000" indent="-228600" algn="l" defTabSz="914400" rtl="0" eaLnBrk="1" latinLnBrk="0" hangingPunct="1">
-                      <a:lnSpc>
-                        <a:spcPct val="90000"/>
-                      </a:lnSpc>
-                      <a:spcBef>
-                        <a:spcPts val="500"/>
-                      </a:spcBef>
-                      <a:buFont typeface="Arial" panose="020B0604020202020204" pitchFamily="34" charset="0"/>
-                      <a:buChar char="•"/>
-                      <a:defRPr sz="2000" kern="1200">
-                        <a:solidFill>
-                          <a:schemeClr val="tx1"/>
-                        </a:solidFill>
-                        <a:latin typeface="+mn-lt"/>
-                        <a:ea typeface="+mn-ea"/>
-                        <a:cs typeface="+mn-cs"/>
-                      </a:defRPr>
-                    </a:lvl3pPr>
-                    <a:lvl4pPr marL="1600200" indent="-228600" algn="l" defTabSz="914400" rtl="0" eaLnBrk="1" latinLnBrk="0" hangingPunct="1">
-                      <a:lnSpc>
-                        <a:spcPct val="90000"/>
-                      </a:lnSpc>
-                      <a:spcBef>
-                        <a:spcPts val="500"/>
-                      </a:spcBef>
-                      <a:buFont typeface="Arial" panose="020B0604020202020204" pitchFamily="34" charset="0"/>
-                      <a:buChar char="•"/>
-                      <a:defRPr sz="1800" kern="1200">
-                        <a:solidFill>
-                          <a:schemeClr val="tx1"/>
-                        </a:solidFill>
-                        <a:latin typeface="+mn-lt"/>
-                        <a:ea typeface="+mn-ea"/>
-                        <a:cs typeface="+mn-cs"/>
-                      </a:defRPr>
-                    </a:lvl4pPr>
-                    <a:lvl5pPr marL="2057400" indent="-228600" algn="l" defTabSz="914400" rtl="0" eaLnBrk="1" latinLnBrk="0" hangingPunct="1">
-                      <a:lnSpc>
-                        <a:spcPct val="90000"/>
-                      </a:lnSpc>
-                      <a:spcBef>
-                        <a:spcPts val="500"/>
-                      </a:spcBef>
-                      <a:buFont typeface="Arial" panose="020B0604020202020204" pitchFamily="34" charset="0"/>
-                      <a:buChar char="•"/>
-                      <a:defRPr sz="1800" kern="1200">
-                        <a:solidFill>
-                          <a:schemeClr val="tx1"/>
-                        </a:solidFill>
-                        <a:latin typeface="+mn-lt"/>
-                        <a:ea typeface="+mn-ea"/>
-                        <a:cs typeface="+mn-cs"/>
-                      </a:defRPr>
-                    </a:lvl5pPr>
-                    <a:lvl6pPr marL="2514600" indent="-228600" algn="l" defTabSz="914400" rtl="0" eaLnBrk="1" latinLnBrk="0" hangingPunct="1">
-                      <a:lnSpc>
-                        <a:spcPct val="90000"/>
-                      </a:lnSpc>
-                      <a:spcBef>
-                        <a:spcPts val="500"/>
-                      </a:spcBef>
-                      <a:buFont typeface="Arial" panose="020B0604020202020204" pitchFamily="34" charset="0"/>
-                      <a:buChar char="•"/>
-                      <a:defRPr sz="1800" kern="1200">
-                        <a:solidFill>
-                          <a:schemeClr val="tx1"/>
-                        </a:solidFill>
-                        <a:latin typeface="+mn-lt"/>
-                        <a:ea typeface="+mn-ea"/>
-                        <a:cs typeface="+mn-cs"/>
-                      </a:defRPr>
-                    </a:lvl6pPr>
-                    <a:lvl7pPr marL="2971800" indent="-228600" algn="l" defTabSz="914400" rtl="0" eaLnBrk="1" latinLnBrk="0" hangingPunct="1">
-                      <a:lnSpc>
-                        <a:spcPct val="90000"/>
-                      </a:lnSpc>
-                      <a:spcBef>
-                        <a:spcPts val="500"/>
-                      </a:spcBef>
-                      <a:buFont typeface="Arial" panose="020B0604020202020204" pitchFamily="34" charset="0"/>
-                      <a:buChar char="•"/>
-                      <a:defRPr sz="1800" kern="1200">
-                        <a:solidFill>
-                          <a:schemeClr val="tx1"/>
-                        </a:solidFill>
-                        <a:latin typeface="+mn-lt"/>
-                        <a:ea typeface="+mn-ea"/>
-                        <a:cs typeface="+mn-cs"/>
-                      </a:defRPr>
-                    </a:lvl7pPr>
-                    <a:lvl8pPr marL="3429000" indent="-228600" algn="l" defTabSz="914400" rtl="0" eaLnBrk="1" latinLnBrk="0" hangingPunct="1">
-                      <a:lnSpc>
-                        <a:spcPct val="90000"/>
-                      </a:lnSpc>
-                      <a:spcBef>
-                        <a:spcPts val="500"/>
-                      </a:spcBef>
-                      <a:buFont typeface="Arial" panose="020B0604020202020204" pitchFamily="34" charset="0"/>
-                      <a:buChar char="•"/>
-                      <a:defRPr sz="1800" kern="1200">
-                        <a:solidFill>
-                          <a:schemeClr val="tx1"/>
-                        </a:solidFill>
-                        <a:latin typeface="+mn-lt"/>
-                        <a:ea typeface="+mn-ea"/>
-                        <a:cs typeface="+mn-cs"/>
-                      </a:defRPr>
-                    </a:lvl8pPr>
-                    <a:lvl9pPr marL="3886200" indent="-228600" algn="l" defTabSz="914400" rtl="0" eaLnBrk="1" latinLnBrk="0" hangingPunct="1">
-                      <a:lnSpc>
-                        <a:spcPct val="90000"/>
-                      </a:lnSpc>
-                      <a:spcBef>
-                        <a:spcPts val="500"/>
-                      </a:spcBef>
-                      <a:buFont typeface="Arial" panose="020B0604020202020204" pitchFamily="34" charset="0"/>
-                      <a:buChar char="•"/>
-                      <a:defRPr sz="1800" kern="1200">
-                        <a:solidFill>
-                          <a:schemeClr val="tx1"/>
-                        </a:solidFill>
-                        <a:latin typeface="+mn-lt"/>
-                        <a:ea typeface="+mn-ea"/>
-                        <a:cs typeface="+mn-cs"/>
-                      </a:defRPr>
-                    </a:lvl9pPr>
-                  </a:lstStyle>
-                  <a:p>
-                    <a:pPr marL="0" indent="0">
-                      <a:buFont typeface="Arial" panose="020B0604020202020204" pitchFamily="34" charset="0"/>
-                      <a:buNone/>
-                    </a:pPr>
-                    <a:r>
-                      <a:rPr lang="en-US" sz="2000" dirty="0" smtClean="0"/>
-                      <a:t>ISP X</a:t>
-                    </a:r>
-                    <a:endParaRPr lang="en-US" sz="2000" dirty="0"/>
-                  </a:p>
-                </p:txBody>
-              </p:sp>
-            </p:grpSp>
             <p:sp>
               <p:nvSpPr>
-                <p:cNvPr id="91" name="Oval 90"/>
+                <p:cNvPr id="98" name="Oval 97"/>
                 <p:cNvSpPr/>
                 <p:nvPr/>
               </p:nvSpPr>
               <p:spPr>
                 <a:xfrm>
-                  <a:off x="4568251" y="6036865"/>
-                  <a:ext cx="152791" cy="160073"/>
+                  <a:off x="4187206" y="4514476"/>
+                  <a:ext cx="4712715" cy="2017651"/>
                 </a:xfrm>
                 <a:prstGeom prst="ellipse">
                   <a:avLst/>
                 </a:prstGeom>
                 <a:solidFill>
-                  <a:schemeClr val="tx1"/>
+                  <a:schemeClr val="accent4">
+                    <a:lumMod val="20000"/>
+                    <a:lumOff val="80000"/>
+                  </a:schemeClr>
                 </a:solidFill>
                 <a:ln>
                   <a:solidFill>
@@ -10549,19 +10143,19 @@
                 <a:lstStyle/>
                 <a:p>
                   <a:pPr algn="ctr"/>
-                  <a:endParaRPr lang="en-US" sz="2000"/>
+                  <a:endParaRPr lang="en-US" sz="2800"/>
                 </a:p>
               </p:txBody>
             </p:sp>
             <p:sp>
               <p:nvSpPr>
-                <p:cNvPr id="92" name="Oval 91"/>
+                <p:cNvPr id="93" name="Oval 92"/>
                 <p:cNvSpPr/>
                 <p:nvPr/>
               </p:nvSpPr>
               <p:spPr>
                 <a:xfrm>
-                  <a:off x="5033040" y="6231407"/>
+                  <a:off x="4187205" y="5195943"/>
                   <a:ext cx="152791" cy="160073"/>
                 </a:xfrm>
                 <a:prstGeom prst="ellipse">
@@ -10600,20 +10194,20 @@
                 <a:lstStyle/>
                 <a:p>
                   <a:pPr algn="ctr"/>
-                  <a:endParaRPr lang="en-US" sz="2000"/>
+                  <a:endParaRPr lang="en-US" sz="2800"/>
                 </a:p>
               </p:txBody>
             </p:sp>
             <p:sp>
               <p:nvSpPr>
-                <p:cNvPr id="93" name="Oval 92"/>
+                <p:cNvPr id="94" name="Oval 93"/>
                 <p:cNvSpPr/>
                 <p:nvPr/>
               </p:nvSpPr>
               <p:spPr>
                 <a:xfrm>
-                  <a:off x="4187205" y="5195943"/>
-                  <a:ext cx="152791" cy="160073"/>
+                  <a:off x="5159481" y="4579028"/>
+                  <a:ext cx="152790" cy="160073"/>
                 </a:xfrm>
                 <a:prstGeom prst="ellipse">
                   <a:avLst/>
@@ -10651,20 +10245,20 @@
                 <a:lstStyle/>
                 <a:p>
                   <a:pPr algn="ctr"/>
-                  <a:endParaRPr lang="en-US" sz="2000"/>
+                  <a:endParaRPr lang="en-US" sz="2800"/>
                 </a:p>
               </p:txBody>
             </p:sp>
             <p:sp>
               <p:nvSpPr>
-                <p:cNvPr id="94" name="Oval 93"/>
+                <p:cNvPr id="96" name="Oval 95"/>
                 <p:cNvSpPr/>
                 <p:nvPr/>
               </p:nvSpPr>
               <p:spPr>
                 <a:xfrm>
-                  <a:off x="4428067" y="4929695"/>
-                  <a:ext cx="152791" cy="160073"/>
+                  <a:off x="8782350" y="5431556"/>
+                  <a:ext cx="152790" cy="160073"/>
                 </a:xfrm>
                 <a:prstGeom prst="ellipse">
                   <a:avLst/>
@@ -10702,20 +10296,20 @@
                 <a:lstStyle/>
                 <a:p>
                   <a:pPr algn="ctr"/>
-                  <a:endParaRPr lang="en-US" sz="2000"/>
+                  <a:endParaRPr lang="en-US" sz="2800"/>
                 </a:p>
               </p:txBody>
             </p:sp>
             <p:sp>
               <p:nvSpPr>
-                <p:cNvPr id="95" name="Oval 94"/>
+                <p:cNvPr id="97" name="Oval 96"/>
                 <p:cNvSpPr/>
                 <p:nvPr/>
               </p:nvSpPr>
               <p:spPr>
                 <a:xfrm>
-                  <a:off x="6543563" y="4415318"/>
-                  <a:ext cx="152791" cy="160073"/>
+                  <a:off x="7923962" y="4651900"/>
+                  <a:ext cx="152790" cy="160073"/>
                 </a:xfrm>
                 <a:prstGeom prst="ellipse">
                   <a:avLst/>
@@ -10753,33 +10347,48 @@
                 <a:lstStyle/>
                 <a:p>
                   <a:pPr algn="ctr"/>
-                  <a:endParaRPr lang="en-US" sz="2000"/>
+                  <a:endParaRPr lang="en-US" sz="2800"/>
                 </a:p>
               </p:txBody>
             </p:sp>
+          </p:grpSp>
+          <p:grpSp>
+            <p:nvGrpSpPr>
+              <p:cNvPr id="65" name="Group 64"/>
+              <p:cNvGrpSpPr/>
+              <p:nvPr/>
+            </p:nvGrpSpPr>
+            <p:grpSpPr>
+              <a:xfrm>
+                <a:off x="2854046" y="2661521"/>
+                <a:ext cx="1867828" cy="1192191"/>
+                <a:chOff x="2202196" y="2000537"/>
+                <a:chExt cx="1867828" cy="1192191"/>
+              </a:xfrm>
+            </p:grpSpPr>
             <p:sp>
               <p:nvSpPr>
-                <p:cNvPr id="96" name="Oval 95"/>
+                <p:cNvPr id="88" name="Cloud 87"/>
                 <p:cNvSpPr/>
                 <p:nvPr/>
               </p:nvSpPr>
               <p:spPr>
                 <a:xfrm>
-                  <a:off x="8738198" y="5703960"/>
-                  <a:ext cx="152791" cy="160073"/>
+                  <a:off x="2202196" y="2000537"/>
+                  <a:ext cx="1867828" cy="1192191"/>
                 </a:xfrm>
-                <a:prstGeom prst="ellipse">
+                <a:prstGeom prst="cloud">
                   <a:avLst/>
                 </a:prstGeom>
                 <a:solidFill>
-                  <a:schemeClr val="tx1"/>
+                  <a:schemeClr val="accent4">
+                    <a:lumMod val="20000"/>
+                    <a:lumOff val="80000"/>
+                  </a:schemeClr>
                 </a:solidFill>
                 <a:ln>
                   <a:solidFill>
-                    <a:schemeClr val="tx1">
-                      <a:lumMod val="85000"/>
-                      <a:lumOff val="15000"/>
-                    </a:schemeClr>
+                    <a:schemeClr val="tx1"/>
                   </a:solidFill>
                 </a:ln>
               </p:spPr>
@@ -10804,124 +10413,7 @@
                 <a:lstStyle/>
                 <a:p>
                   <a:pPr algn="ctr"/>
-                  <a:endParaRPr lang="en-US" sz="2000"/>
-                </a:p>
-              </p:txBody>
-            </p:sp>
-            <p:sp>
-              <p:nvSpPr>
-                <p:cNvPr id="97" name="Oval 96"/>
-                <p:cNvSpPr/>
-                <p:nvPr/>
-              </p:nvSpPr>
-              <p:spPr>
-                <a:xfrm>
-                  <a:off x="8738199" y="5195942"/>
-                  <a:ext cx="152791" cy="160073"/>
-                </a:xfrm>
-                <a:prstGeom prst="ellipse">
-                  <a:avLst/>
-                </a:prstGeom>
-                <a:solidFill>
-                  <a:schemeClr val="tx1"/>
-                </a:solidFill>
-                <a:ln>
-                  <a:solidFill>
-                    <a:schemeClr val="tx1">
-                      <a:lumMod val="85000"/>
-                      <a:lumOff val="15000"/>
-                    </a:schemeClr>
-                  </a:solidFill>
-                </a:ln>
-              </p:spPr>
-              <p:style>
-                <a:lnRef idx="2">
-                  <a:schemeClr val="accent1">
-                    <a:shade val="50000"/>
-                  </a:schemeClr>
-                </a:lnRef>
-                <a:fillRef idx="1">
-                  <a:schemeClr val="accent1"/>
-                </a:fillRef>
-                <a:effectRef idx="0">
-                  <a:schemeClr val="accent1"/>
-                </a:effectRef>
-                <a:fontRef idx="minor">
-                  <a:schemeClr val="lt1"/>
-                </a:fontRef>
-              </p:style>
-              <p:txBody>
-                <a:bodyPr rtlCol="0" anchor="ctr"/>
-                <a:lstStyle/>
-                <a:p>
-                  <a:pPr algn="ctr"/>
-                  <a:endParaRPr lang="en-US" sz="2000"/>
-                </a:p>
-              </p:txBody>
-            </p:sp>
-          </p:grpSp>
-          <p:grpSp>
-            <p:nvGrpSpPr>
-              <p:cNvPr id="65" name="Group 64"/>
-              <p:cNvGrpSpPr/>
-              <p:nvPr/>
-            </p:nvGrpSpPr>
-            <p:grpSpPr>
-              <a:xfrm>
-                <a:off x="1318993" y="3087313"/>
-                <a:ext cx="1867828" cy="1192191"/>
-                <a:chOff x="667143" y="2426329"/>
-                <a:chExt cx="1867828" cy="1192191"/>
-              </a:xfrm>
-            </p:grpSpPr>
-            <p:sp>
-              <p:nvSpPr>
-                <p:cNvPr id="88" name="Cloud 87"/>
-                <p:cNvSpPr/>
-                <p:nvPr/>
-              </p:nvSpPr>
-              <p:spPr>
-                <a:xfrm>
-                  <a:off x="667143" y="2426329"/>
-                  <a:ext cx="1867828" cy="1192191"/>
-                </a:xfrm>
-                <a:prstGeom prst="cloud">
-                  <a:avLst/>
-                </a:prstGeom>
-                <a:solidFill>
-                  <a:schemeClr val="accent4">
-                    <a:lumMod val="20000"/>
-                    <a:lumOff val="80000"/>
-                  </a:schemeClr>
-                </a:solidFill>
-                <a:ln>
-                  <a:solidFill>
-                    <a:schemeClr val="tx1"/>
-                  </a:solidFill>
-                </a:ln>
-              </p:spPr>
-              <p:style>
-                <a:lnRef idx="2">
-                  <a:schemeClr val="accent1">
-                    <a:shade val="50000"/>
-                  </a:schemeClr>
-                </a:lnRef>
-                <a:fillRef idx="1">
-                  <a:schemeClr val="accent1"/>
-                </a:fillRef>
-                <a:effectRef idx="0">
-                  <a:schemeClr val="accent1"/>
-                </a:effectRef>
-                <a:fontRef idx="minor">
-                  <a:schemeClr val="lt1"/>
-                </a:fontRef>
-              </p:style>
-              <p:txBody>
-                <a:bodyPr rtlCol="0" anchor="ctr"/>
-                <a:lstStyle/>
-                <a:p>
-                  <a:pPr algn="ctr"/>
-                  <a:endParaRPr lang="en-US" sz="2000"/>
+                  <a:endParaRPr lang="en-US" sz="2800"/>
                 </a:p>
               </p:txBody>
             </p:sp>
@@ -10935,8 +10427,8 @@
               </p:nvSpPr>
               <p:spPr>
                 <a:xfrm>
-                  <a:off x="1390943" y="2869361"/>
-                  <a:ext cx="743950" cy="394855"/>
+                  <a:off x="2466702" y="2274888"/>
+                  <a:ext cx="1502821" cy="394855"/>
                 </a:xfrm>
                 <a:prstGeom prst="rect">
                   <a:avLst/>
@@ -11116,10 +10608,10 @@
                     <a:buNone/>
                   </a:pPr>
                   <a:r>
-                    <a:rPr lang="en-US" sz="2000" dirty="0" smtClean="0"/>
-                    <a:t>C1</a:t>
+                    <a:rPr lang="en-US" dirty="0" err="1" smtClean="0"/>
+                    <a:t>Cust</a:t>
                   </a:r>
-                  <a:endParaRPr lang="en-US" sz="2000" dirty="0"/>
+                  <a:endParaRPr lang="en-US" dirty="0"/>
                 </a:p>
               </p:txBody>
             </p:sp>
@@ -11128,19 +10620,20 @@
             <p:nvCxnSpPr>
               <p:cNvPr id="66" name="Straight Connector 65"/>
               <p:cNvCxnSpPr>
+                <a:stCxn id="88" idx="1"/>
                 <a:endCxn id="93" idx="2"/>
               </p:cNvCxnSpPr>
               <p:nvPr/>
             </p:nvCxnSpPr>
             <p:spPr>
-              <a:xfrm>
-                <a:off x="2786743" y="4111911"/>
-                <a:ext cx="908781" cy="513878"/>
+              <a:xfrm flipH="1">
+                <a:off x="3695524" y="3852443"/>
+                <a:ext cx="92436" cy="773347"/>
               </a:xfrm>
               <a:prstGeom prst="line">
                 <a:avLst/>
               </a:prstGeom>
-              <a:ln>
+              <a:ln w="28575">
                 <a:solidFill>
                   <a:schemeClr val="tx1"/>
                 </a:solidFill>
@@ -11165,20 +10658,19 @@
             <p:nvCxnSpPr>
               <p:cNvPr id="68" name="Straight Connector 67"/>
               <p:cNvCxnSpPr>
-                <a:stCxn id="88" idx="0"/>
-                <a:endCxn id="94" idx="1"/>
+                <a:endCxn id="94" idx="0"/>
               </p:cNvCxnSpPr>
               <p:nvPr/>
             </p:nvCxnSpPr>
             <p:spPr>
               <a:xfrm>
-                <a:off x="3185264" y="3683409"/>
-                <a:ext cx="773498" cy="619537"/>
+                <a:off x="4458126" y="3451117"/>
+                <a:ext cx="286070" cy="477721"/>
               </a:xfrm>
               <a:prstGeom prst="line">
                 <a:avLst/>
               </a:prstGeom>
-              <a:ln>
+              <a:ln w="28575">
                 <a:solidFill>
                   <a:schemeClr val="tx1"/>
                 </a:solidFill>
@@ -11201,27 +10693,27 @@
           </p:cxnSp>
           <p:grpSp>
             <p:nvGrpSpPr>
-              <p:cNvPr id="69" name="Group 68"/>
+              <p:cNvPr id="72" name="Group 71"/>
               <p:cNvGrpSpPr/>
               <p:nvPr/>
             </p:nvGrpSpPr>
             <p:grpSpPr>
               <a:xfrm>
-                <a:off x="1852829" y="5466711"/>
+                <a:off x="5299395" y="2236423"/>
                 <a:ext cx="1867828" cy="1192191"/>
-                <a:chOff x="667143" y="2426329"/>
+                <a:chOff x="1066145" y="2478587"/>
                 <a:chExt cx="1867828" cy="1192191"/>
               </a:xfrm>
             </p:grpSpPr>
             <p:sp>
               <p:nvSpPr>
-                <p:cNvPr id="86" name="Cloud 85"/>
+                <p:cNvPr id="84" name="Cloud 83"/>
                 <p:cNvSpPr/>
                 <p:nvPr/>
               </p:nvSpPr>
               <p:spPr>
                 <a:xfrm>
-                  <a:off x="667143" y="2426329"/>
+                  <a:off x="1066145" y="2478587"/>
                   <a:ext cx="1867828" cy="1192191"/>
                 </a:xfrm>
                 <a:prstGeom prst="cloud">
@@ -11260,13 +10752,13 @@
                 <a:lstStyle/>
                 <a:p>
                   <a:pPr algn="ctr"/>
-                  <a:endParaRPr lang="en-US" sz="2000"/>
+                  <a:endParaRPr lang="en-US" sz="2800"/>
                 </a:p>
               </p:txBody>
             </p:sp>
             <p:sp>
               <p:nvSpPr>
-                <p:cNvPr id="87" name="Content Placeholder 2"/>
+                <p:cNvPr id="85" name="Content Placeholder 2"/>
                 <p:cNvSpPr txBox="1">
                   <a:spLocks/>
                 </p:cNvSpPr>
@@ -11274,8 +10766,8 @@
               </p:nvSpPr>
               <p:spPr>
                 <a:xfrm>
-                  <a:off x="1390943" y="2869361"/>
-                  <a:ext cx="429531" cy="306127"/>
+                  <a:off x="1366192" y="2679574"/>
+                  <a:ext cx="1438081" cy="306127"/>
                 </a:xfrm>
                 <a:prstGeom prst="rect">
                   <a:avLst/>
@@ -11455,68 +10947,31 @@
                     <a:buNone/>
                   </a:pPr>
                   <a:r>
-                    <a:rPr lang="en-US" sz="2000" dirty="0" smtClean="0"/>
-                    <a:t>C2</a:t>
+                    <a:rPr lang="en-US" dirty="0" err="1" smtClean="0"/>
+                    <a:t>Prov</a:t>
                   </a:r>
+                  <a:endParaRPr lang="en-US" dirty="0"/>
                 </a:p>
               </p:txBody>
             </p:sp>
           </p:grpSp>
           <p:cxnSp>
             <p:nvCxnSpPr>
-              <p:cNvPr id="70" name="Straight Connector 69"/>
+              <p:cNvPr id="74" name="Straight Connector 73"/>
               <p:cNvCxnSpPr>
-                <a:endCxn id="91" idx="3"/>
+                <a:endCxn id="94" idx="6"/>
               </p:cNvCxnSpPr>
               <p:nvPr/>
             </p:nvCxnSpPr>
             <p:spPr>
-              <a:xfrm flipV="1">
-                <a:off x="3511470" y="5523305"/>
-                <a:ext cx="587476" cy="103479"/>
+              <a:xfrm flipH="1">
+                <a:off x="4820589" y="3350205"/>
+                <a:ext cx="879840" cy="658670"/>
               </a:xfrm>
               <a:prstGeom prst="line">
                 <a:avLst/>
               </a:prstGeom>
-              <a:ln>
-                <a:solidFill>
-                  <a:schemeClr val="tx1"/>
-                </a:solidFill>
-              </a:ln>
-            </p:spPr>
-            <p:style>
-              <a:lnRef idx="1">
-                <a:schemeClr val="accent1"/>
-              </a:lnRef>
-              <a:fillRef idx="0">
-                <a:schemeClr val="accent1"/>
-              </a:fillRef>
-              <a:effectRef idx="0">
-                <a:schemeClr val="accent1"/>
-              </a:effectRef>
-              <a:fontRef idx="minor">
-                <a:schemeClr val="tx1"/>
-              </a:fontRef>
-            </p:style>
-          </p:cxnSp>
-          <p:cxnSp>
-            <p:nvCxnSpPr>
-              <p:cNvPr id="71" name="Straight Connector 70"/>
-              <p:cNvCxnSpPr>
-                <a:stCxn id="86" idx="0"/>
-                <a:endCxn id="92" idx="3"/>
-              </p:cNvCxnSpPr>
-              <p:nvPr/>
-            </p:nvCxnSpPr>
-            <p:spPr>
-              <a:xfrm flipV="1">
-                <a:off x="3719100" y="5717847"/>
-                <a:ext cx="844635" cy="344960"/>
-              </a:xfrm>
-              <a:prstGeom prst="line">
-                <a:avLst/>
-              </a:prstGeom>
-              <a:ln>
+              <a:ln w="28575">
                 <a:solidFill>
                   <a:schemeClr val="tx1"/>
                 </a:solidFill>
@@ -11539,28 +10994,28 @@
           </p:cxnSp>
           <p:grpSp>
             <p:nvGrpSpPr>
-              <p:cNvPr id="72" name="Group 71"/>
+              <p:cNvPr id="75" name="Group 74"/>
               <p:cNvGrpSpPr/>
               <p:nvPr/>
             </p:nvGrpSpPr>
             <p:grpSpPr>
               <a:xfrm>
-                <a:off x="4900393" y="2184165"/>
-                <a:ext cx="1867828" cy="1192191"/>
-                <a:chOff x="667143" y="2426329"/>
-                <a:chExt cx="1867828" cy="1192191"/>
+                <a:off x="7621164" y="2339777"/>
+                <a:ext cx="1867829" cy="1192191"/>
+                <a:chOff x="-628638" y="411550"/>
+                <a:chExt cx="1867829" cy="1192191"/>
               </a:xfrm>
             </p:grpSpPr>
             <p:sp>
               <p:nvSpPr>
-                <p:cNvPr id="84" name="Cloud 83"/>
+                <p:cNvPr id="82" name="Cloud 81"/>
                 <p:cNvSpPr/>
                 <p:nvPr/>
               </p:nvSpPr>
               <p:spPr>
                 <a:xfrm>
-                  <a:off x="667143" y="2426329"/>
-                  <a:ext cx="1867828" cy="1192191"/>
+                  <a:off x="-628638" y="411550"/>
+                  <a:ext cx="1867829" cy="1192191"/>
                 </a:xfrm>
                 <a:prstGeom prst="cloud">
                   <a:avLst/>
@@ -11598,13 +11053,13 @@
                 <a:lstStyle/>
                 <a:p>
                   <a:pPr algn="ctr"/>
-                  <a:endParaRPr lang="en-US" sz="2000"/>
+                  <a:endParaRPr lang="en-US" sz="2800"/>
                 </a:p>
               </p:txBody>
             </p:sp>
             <p:sp>
               <p:nvSpPr>
-                <p:cNvPr id="85" name="Content Placeholder 2"/>
+                <p:cNvPr id="83" name="Content Placeholder 2"/>
                 <p:cNvSpPr txBox="1">
                   <a:spLocks/>
                 </p:cNvSpPr>
@@ -11612,8 +11067,8 @@
               </p:nvSpPr>
               <p:spPr>
                 <a:xfrm>
-                  <a:off x="1511702" y="2869361"/>
-                  <a:ext cx="510812" cy="306126"/>
+                  <a:off x="-306312" y="611884"/>
+                  <a:ext cx="1395396" cy="306127"/>
                 </a:xfrm>
                 <a:prstGeom prst="rect">
                   <a:avLst/>
@@ -11621,7 +11076,7 @@
               </p:spPr>
               <p:txBody>
                 <a:bodyPr vert="horz" lIns="91440" tIns="45720" rIns="91440" bIns="45720" rtlCol="0">
-                  <a:normAutofit fontScale="62500" lnSpcReduction="20000"/>
+                  <a:noAutofit/>
                 </a:bodyPr>
                 <a:lstStyle>
                   <a:lvl1pPr marL="228600" indent="-228600" algn="l" defTabSz="914400" rtl="0" eaLnBrk="1" latinLnBrk="0" hangingPunct="1">
@@ -11793,502 +11248,35 @@
                     <a:buNone/>
                   </a:pPr>
                   <a:r>
-                    <a:rPr lang="en-US" sz="2000" dirty="0" smtClean="0"/>
-                    <a:t>Y</a:t>
+                    <a:rPr lang="en-US" dirty="0" smtClean="0"/>
+                    <a:t>Peer</a:t>
                   </a:r>
-                  <a:endParaRPr lang="en-US" sz="2000" dirty="0"/>
+                  <a:endParaRPr lang="en-US" dirty="0"/>
                 </a:p>
               </p:txBody>
             </p:sp>
           </p:grpSp>
           <p:cxnSp>
             <p:nvCxnSpPr>
-              <p:cNvPr id="74" name="Straight Connector 73"/>
+              <p:cNvPr id="78" name="Straight Connector 77"/>
               <p:cNvCxnSpPr>
-                <a:endCxn id="95" idx="0"/>
-              </p:cNvCxnSpPr>
-              <p:nvPr/>
-            </p:nvCxnSpPr>
-            <p:spPr>
-              <a:xfrm>
-                <a:off x="6000358" y="3375637"/>
-                <a:ext cx="127920" cy="389490"/>
-              </a:xfrm>
-              <a:prstGeom prst="line">
-                <a:avLst/>
-              </a:prstGeom>
-              <a:ln>
-                <a:solidFill>
-                  <a:schemeClr val="tx1"/>
-                </a:solidFill>
-              </a:ln>
-            </p:spPr>
-            <p:style>
-              <a:lnRef idx="1">
-                <a:schemeClr val="accent1"/>
-              </a:lnRef>
-              <a:fillRef idx="0">
-                <a:schemeClr val="accent1"/>
-              </a:fillRef>
-              <a:effectRef idx="0">
-                <a:schemeClr val="accent1"/>
-              </a:effectRef>
-              <a:fontRef idx="minor">
-                <a:schemeClr val="tx1"/>
-              </a:fontRef>
-            </p:style>
-          </p:cxnSp>
-          <p:grpSp>
-            <p:nvGrpSpPr>
-              <p:cNvPr id="75" name="Group 74"/>
-              <p:cNvGrpSpPr/>
-              <p:nvPr/>
-            </p:nvGrpSpPr>
-            <p:grpSpPr>
-              <a:xfrm>
-                <a:off x="8916945" y="4354556"/>
-                <a:ext cx="1867828" cy="1192191"/>
-                <a:chOff x="667143" y="2426329"/>
-                <a:chExt cx="1867828" cy="1192191"/>
-              </a:xfrm>
-            </p:grpSpPr>
-            <p:sp>
-              <p:nvSpPr>
-                <p:cNvPr id="82" name="Cloud 81"/>
-                <p:cNvSpPr/>
-                <p:nvPr/>
-              </p:nvSpPr>
-              <p:spPr>
-                <a:xfrm>
-                  <a:off x="667143" y="2426329"/>
-                  <a:ext cx="1867828" cy="1192191"/>
-                </a:xfrm>
-                <a:prstGeom prst="cloud">
-                  <a:avLst/>
-                </a:prstGeom>
-                <a:solidFill>
-                  <a:schemeClr val="accent4">
-                    <a:lumMod val="20000"/>
-                    <a:lumOff val="80000"/>
-                  </a:schemeClr>
-                </a:solidFill>
-                <a:ln>
-                  <a:solidFill>
-                    <a:schemeClr val="tx1"/>
-                  </a:solidFill>
-                </a:ln>
-              </p:spPr>
-              <p:style>
-                <a:lnRef idx="2">
-                  <a:schemeClr val="accent1">
-                    <a:shade val="50000"/>
-                  </a:schemeClr>
-                </a:lnRef>
-                <a:fillRef idx="1">
-                  <a:schemeClr val="accent1"/>
-                </a:fillRef>
-                <a:effectRef idx="0">
-                  <a:schemeClr val="accent1"/>
-                </a:effectRef>
-                <a:fontRef idx="minor">
-                  <a:schemeClr val="lt1"/>
-                </a:fontRef>
-              </p:style>
-              <p:txBody>
-                <a:bodyPr rtlCol="0" anchor="ctr"/>
-                <a:lstStyle/>
-                <a:p>
-                  <a:pPr algn="ctr"/>
-                  <a:endParaRPr lang="en-US" sz="2000"/>
-                </a:p>
-              </p:txBody>
-            </p:sp>
-            <p:sp>
-              <p:nvSpPr>
-                <p:cNvPr id="83" name="Content Placeholder 2"/>
-                <p:cNvSpPr txBox="1">
-                  <a:spLocks/>
-                </p:cNvSpPr>
-                <p:nvPr/>
-              </p:nvSpPr>
-              <p:spPr>
-                <a:xfrm>
-                  <a:off x="1511702" y="2869361"/>
-                  <a:ext cx="510812" cy="306127"/>
-                </a:xfrm>
-                <a:prstGeom prst="rect">
-                  <a:avLst/>
-                </a:prstGeom>
-              </p:spPr>
-              <p:txBody>
-                <a:bodyPr vert="horz" lIns="91440" tIns="45720" rIns="91440" bIns="45720" rtlCol="0">
-                  <a:normAutofit fontScale="62500" lnSpcReduction="20000"/>
-                </a:bodyPr>
-                <a:lstStyle>
-                  <a:lvl1pPr marL="228600" indent="-228600" algn="l" defTabSz="914400" rtl="0" eaLnBrk="1" latinLnBrk="0" hangingPunct="1">
-                    <a:lnSpc>
-                      <a:spcPct val="90000"/>
-                    </a:lnSpc>
-                    <a:spcBef>
-                      <a:spcPts val="1000"/>
-                    </a:spcBef>
-                    <a:buFont typeface="Arial" panose="020B0604020202020204" pitchFamily="34" charset="0"/>
-                    <a:buChar char="•"/>
-                    <a:defRPr sz="2800" kern="1200">
-                      <a:solidFill>
-                        <a:schemeClr val="tx1"/>
-                      </a:solidFill>
-                      <a:latin typeface="+mn-lt"/>
-                      <a:ea typeface="+mn-ea"/>
-                      <a:cs typeface="+mn-cs"/>
-                    </a:defRPr>
-                  </a:lvl1pPr>
-                  <a:lvl2pPr marL="685800" indent="-228600" algn="l" defTabSz="914400" rtl="0" eaLnBrk="1" latinLnBrk="0" hangingPunct="1">
-                    <a:lnSpc>
-                      <a:spcPct val="90000"/>
-                    </a:lnSpc>
-                    <a:spcBef>
-                      <a:spcPts val="500"/>
-                    </a:spcBef>
-                    <a:buFont typeface="Arial" panose="020B0604020202020204" pitchFamily="34" charset="0"/>
-                    <a:buChar char="•"/>
-                    <a:defRPr sz="2400" kern="1200">
-                      <a:solidFill>
-                        <a:schemeClr val="tx1"/>
-                      </a:solidFill>
-                      <a:latin typeface="+mn-lt"/>
-                      <a:ea typeface="+mn-ea"/>
-                      <a:cs typeface="+mn-cs"/>
-                    </a:defRPr>
-                  </a:lvl2pPr>
-                  <a:lvl3pPr marL="1143000" indent="-228600" algn="l" defTabSz="914400" rtl="0" eaLnBrk="1" latinLnBrk="0" hangingPunct="1">
-                    <a:lnSpc>
-                      <a:spcPct val="90000"/>
-                    </a:lnSpc>
-                    <a:spcBef>
-                      <a:spcPts val="500"/>
-                    </a:spcBef>
-                    <a:buFont typeface="Arial" panose="020B0604020202020204" pitchFamily="34" charset="0"/>
-                    <a:buChar char="•"/>
-                    <a:defRPr sz="2000" kern="1200">
-                      <a:solidFill>
-                        <a:schemeClr val="tx1"/>
-                      </a:solidFill>
-                      <a:latin typeface="+mn-lt"/>
-                      <a:ea typeface="+mn-ea"/>
-                      <a:cs typeface="+mn-cs"/>
-                    </a:defRPr>
-                  </a:lvl3pPr>
-                  <a:lvl4pPr marL="1600200" indent="-228600" algn="l" defTabSz="914400" rtl="0" eaLnBrk="1" latinLnBrk="0" hangingPunct="1">
-                    <a:lnSpc>
-                      <a:spcPct val="90000"/>
-                    </a:lnSpc>
-                    <a:spcBef>
-                      <a:spcPts val="500"/>
-                    </a:spcBef>
-                    <a:buFont typeface="Arial" panose="020B0604020202020204" pitchFamily="34" charset="0"/>
-                    <a:buChar char="•"/>
-                    <a:defRPr sz="1800" kern="1200">
-                      <a:solidFill>
-                        <a:schemeClr val="tx1"/>
-                      </a:solidFill>
-                      <a:latin typeface="+mn-lt"/>
-                      <a:ea typeface="+mn-ea"/>
-                      <a:cs typeface="+mn-cs"/>
-                    </a:defRPr>
-                  </a:lvl4pPr>
-                  <a:lvl5pPr marL="2057400" indent="-228600" algn="l" defTabSz="914400" rtl="0" eaLnBrk="1" latinLnBrk="0" hangingPunct="1">
-                    <a:lnSpc>
-                      <a:spcPct val="90000"/>
-                    </a:lnSpc>
-                    <a:spcBef>
-                      <a:spcPts val="500"/>
-                    </a:spcBef>
-                    <a:buFont typeface="Arial" panose="020B0604020202020204" pitchFamily="34" charset="0"/>
-                    <a:buChar char="•"/>
-                    <a:defRPr sz="1800" kern="1200">
-                      <a:solidFill>
-                        <a:schemeClr val="tx1"/>
-                      </a:solidFill>
-                      <a:latin typeface="+mn-lt"/>
-                      <a:ea typeface="+mn-ea"/>
-                      <a:cs typeface="+mn-cs"/>
-                    </a:defRPr>
-                  </a:lvl5pPr>
-                  <a:lvl6pPr marL="2514600" indent="-228600" algn="l" defTabSz="914400" rtl="0" eaLnBrk="1" latinLnBrk="0" hangingPunct="1">
-                    <a:lnSpc>
-                      <a:spcPct val="90000"/>
-                    </a:lnSpc>
-                    <a:spcBef>
-                      <a:spcPts val="500"/>
-                    </a:spcBef>
-                    <a:buFont typeface="Arial" panose="020B0604020202020204" pitchFamily="34" charset="0"/>
-                    <a:buChar char="•"/>
-                    <a:defRPr sz="1800" kern="1200">
-                      <a:solidFill>
-                        <a:schemeClr val="tx1"/>
-                      </a:solidFill>
-                      <a:latin typeface="+mn-lt"/>
-                      <a:ea typeface="+mn-ea"/>
-                      <a:cs typeface="+mn-cs"/>
-                    </a:defRPr>
-                  </a:lvl6pPr>
-                  <a:lvl7pPr marL="2971800" indent="-228600" algn="l" defTabSz="914400" rtl="0" eaLnBrk="1" latinLnBrk="0" hangingPunct="1">
-                    <a:lnSpc>
-                      <a:spcPct val="90000"/>
-                    </a:lnSpc>
-                    <a:spcBef>
-                      <a:spcPts val="500"/>
-                    </a:spcBef>
-                    <a:buFont typeface="Arial" panose="020B0604020202020204" pitchFamily="34" charset="0"/>
-                    <a:buChar char="•"/>
-                    <a:defRPr sz="1800" kern="1200">
-                      <a:solidFill>
-                        <a:schemeClr val="tx1"/>
-                      </a:solidFill>
-                      <a:latin typeface="+mn-lt"/>
-                      <a:ea typeface="+mn-ea"/>
-                      <a:cs typeface="+mn-cs"/>
-                    </a:defRPr>
-                  </a:lvl7pPr>
-                  <a:lvl8pPr marL="3429000" indent="-228600" algn="l" defTabSz="914400" rtl="0" eaLnBrk="1" latinLnBrk="0" hangingPunct="1">
-                    <a:lnSpc>
-                      <a:spcPct val="90000"/>
-                    </a:lnSpc>
-                    <a:spcBef>
-                      <a:spcPts val="500"/>
-                    </a:spcBef>
-                    <a:buFont typeface="Arial" panose="020B0604020202020204" pitchFamily="34" charset="0"/>
-                    <a:buChar char="•"/>
-                    <a:defRPr sz="1800" kern="1200">
-                      <a:solidFill>
-                        <a:schemeClr val="tx1"/>
-                      </a:solidFill>
-                      <a:latin typeface="+mn-lt"/>
-                      <a:ea typeface="+mn-ea"/>
-                      <a:cs typeface="+mn-cs"/>
-                    </a:defRPr>
-                  </a:lvl8pPr>
-                  <a:lvl9pPr marL="3886200" indent="-228600" algn="l" defTabSz="914400" rtl="0" eaLnBrk="1" latinLnBrk="0" hangingPunct="1">
-                    <a:lnSpc>
-                      <a:spcPct val="90000"/>
-                    </a:lnSpc>
-                    <a:spcBef>
-                      <a:spcPts val="500"/>
-                    </a:spcBef>
-                    <a:buFont typeface="Arial" panose="020B0604020202020204" pitchFamily="34" charset="0"/>
-                    <a:buChar char="•"/>
-                    <a:defRPr sz="1800" kern="1200">
-                      <a:solidFill>
-                        <a:schemeClr val="tx1"/>
-                      </a:solidFill>
-                      <a:latin typeface="+mn-lt"/>
-                      <a:ea typeface="+mn-ea"/>
-                      <a:cs typeface="+mn-cs"/>
-                    </a:defRPr>
-                  </a:lvl9pPr>
-                </a:lstStyle>
-                <a:p>
-                  <a:pPr marL="0" indent="0">
-                    <a:buFont typeface="Arial" panose="020B0604020202020204" pitchFamily="34" charset="0"/>
-                    <a:buNone/>
-                  </a:pPr>
-                  <a:r>
-                    <a:rPr lang="en-US" sz="2000" dirty="0" smtClean="0"/>
-                    <a:t>Z</a:t>
-                  </a:r>
-                  <a:endParaRPr lang="en-US" sz="2000" dirty="0"/>
-                </a:p>
-              </p:txBody>
-            </p:sp>
-          </p:grpSp>
-          <p:cxnSp>
-            <p:nvCxnSpPr>
-              <p:cNvPr id="77" name="Straight Connector 76"/>
-              <p:cNvCxnSpPr>
-                <a:stCxn id="97" idx="6"/>
+                <a:stCxn id="98" idx="6"/>
+                <a:endCxn id="82" idx="1"/>
               </p:cNvCxnSpPr>
               <p:nvPr/>
             </p:nvCxnSpPr>
             <p:spPr>
               <a:xfrm flipV="1">
-                <a:off x="8399309" y="4625787"/>
-                <a:ext cx="712034" cy="1"/>
+                <a:off x="8408242" y="3530698"/>
+                <a:ext cx="146837" cy="1342412"/>
               </a:xfrm>
               <a:prstGeom prst="line">
                 <a:avLst/>
               </a:prstGeom>
-              <a:ln>
+              <a:ln w="28575">
                 <a:solidFill>
                   <a:schemeClr val="tx1"/>
                 </a:solidFill>
-              </a:ln>
-            </p:spPr>
-            <p:style>
-              <a:lnRef idx="1">
-                <a:schemeClr val="accent1"/>
-              </a:lnRef>
-              <a:fillRef idx="0">
-                <a:schemeClr val="accent1"/>
-              </a:fillRef>
-              <a:effectRef idx="0">
-                <a:schemeClr val="accent1"/>
-              </a:effectRef>
-              <a:fontRef idx="minor">
-                <a:schemeClr val="tx1"/>
-              </a:fontRef>
-            </p:style>
-          </p:cxnSp>
-          <p:cxnSp>
-            <p:nvCxnSpPr>
-              <p:cNvPr id="78" name="Straight Connector 77"/>
-              <p:cNvCxnSpPr>
-                <a:stCxn id="96" idx="6"/>
-                <a:endCxn id="82" idx="2"/>
-              </p:cNvCxnSpPr>
-              <p:nvPr/>
-            </p:nvCxnSpPr>
-            <p:spPr>
-              <a:xfrm flipV="1">
-                <a:off x="8399308" y="4950652"/>
-                <a:ext cx="523431" cy="183154"/>
-              </a:xfrm>
-              <a:prstGeom prst="line">
-                <a:avLst/>
-              </a:prstGeom>
-              <a:ln>
-                <a:solidFill>
-                  <a:schemeClr val="tx1"/>
-                </a:solidFill>
-              </a:ln>
-            </p:spPr>
-            <p:style>
-              <a:lnRef idx="1">
-                <a:schemeClr val="accent1"/>
-              </a:lnRef>
-              <a:fillRef idx="0">
-                <a:schemeClr val="accent1"/>
-              </a:fillRef>
-              <a:effectRef idx="0">
-                <a:schemeClr val="accent1"/>
-              </a:effectRef>
-              <a:fontRef idx="minor">
-                <a:schemeClr val="tx1"/>
-              </a:fontRef>
-            </p:style>
-          </p:cxnSp>
-          <p:cxnSp>
-            <p:nvCxnSpPr>
-              <p:cNvPr id="79" name="Straight Connector 78"/>
-              <p:cNvCxnSpPr>
-                <a:stCxn id="84" idx="0"/>
-                <a:endCxn id="80" idx="2"/>
-              </p:cNvCxnSpPr>
-              <p:nvPr/>
-            </p:nvCxnSpPr>
-            <p:spPr>
-              <a:xfrm>
-                <a:off x="6766664" y="2780261"/>
-                <a:ext cx="1388212" cy="477358"/>
-              </a:xfrm>
-              <a:prstGeom prst="line">
-                <a:avLst/>
-              </a:prstGeom>
-              <a:ln>
-                <a:solidFill>
-                  <a:schemeClr val="tx1"/>
-                </a:solidFill>
-                <a:prstDash val="sysDash"/>
-              </a:ln>
-            </p:spPr>
-            <p:style>
-              <a:lnRef idx="1">
-                <a:schemeClr val="accent1"/>
-              </a:lnRef>
-              <a:fillRef idx="0">
-                <a:schemeClr val="accent1"/>
-              </a:fillRef>
-              <a:effectRef idx="0">
-                <a:schemeClr val="accent1"/>
-              </a:effectRef>
-              <a:fontRef idx="minor">
-                <a:schemeClr val="tx1"/>
-              </a:fontRef>
-            </p:style>
-          </p:cxnSp>
-          <p:sp>
-            <p:nvSpPr>
-              <p:cNvPr id="80" name="Cloud 79"/>
-              <p:cNvSpPr/>
-              <p:nvPr/>
-            </p:nvSpPr>
-            <p:spPr>
-              <a:xfrm>
-                <a:off x="8149082" y="2661523"/>
-                <a:ext cx="1867828" cy="1192191"/>
-              </a:xfrm>
-              <a:prstGeom prst="cloud">
-                <a:avLst/>
-              </a:prstGeom>
-              <a:solidFill>
-                <a:schemeClr val="accent4">
-                  <a:lumMod val="20000"/>
-                  <a:lumOff val="80000"/>
-                </a:schemeClr>
-              </a:solidFill>
-              <a:ln>
-                <a:solidFill>
-                  <a:schemeClr val="tx1"/>
-                </a:solidFill>
-              </a:ln>
-            </p:spPr>
-            <p:style>
-              <a:lnRef idx="2">
-                <a:schemeClr val="accent1">
-                  <a:shade val="50000"/>
-                </a:schemeClr>
-              </a:lnRef>
-              <a:fillRef idx="1">
-                <a:schemeClr val="accent1"/>
-              </a:fillRef>
-              <a:effectRef idx="0">
-                <a:schemeClr val="accent1"/>
-              </a:effectRef>
-              <a:fontRef idx="minor">
-                <a:schemeClr val="lt1"/>
-              </a:fontRef>
-            </p:style>
-            <p:txBody>
-              <a:bodyPr rtlCol="0" anchor="ctr"/>
-              <a:lstStyle/>
-              <a:p>
-                <a:pPr algn="ctr"/>
-                <a:endParaRPr lang="en-US" sz="2000"/>
-              </a:p>
-            </p:txBody>
-          </p:sp>
-          <p:cxnSp>
-            <p:nvCxnSpPr>
-              <p:cNvPr id="81" name="Straight Connector 80"/>
-              <p:cNvCxnSpPr>
-                <a:stCxn id="80" idx="1"/>
-                <a:endCxn id="82" idx="3"/>
-              </p:cNvCxnSpPr>
-              <p:nvPr/>
-            </p:nvCxnSpPr>
-            <p:spPr>
-              <a:xfrm>
-                <a:off x="9082996" y="3852445"/>
-                <a:ext cx="767863" cy="570276"/>
-              </a:xfrm>
-              <a:prstGeom prst="line">
-                <a:avLst/>
-              </a:prstGeom>
-              <a:ln>
-                <a:solidFill>
-                  <a:schemeClr val="tx1"/>
-                </a:solidFill>
-                <a:prstDash val="sysDash"/>
               </a:ln>
             </p:spPr>
             <p:style>
@@ -12317,8 +11305,8 @@
           </p:nvSpPr>
           <p:spPr>
             <a:xfrm>
-              <a:off x="4450225" y="3616880"/>
-              <a:ext cx="643362" cy="260170"/>
+              <a:off x="4851292" y="3470685"/>
+              <a:ext cx="752146" cy="260170"/>
             </a:xfrm>
             <a:prstGeom prst="rect">
               <a:avLst/>
@@ -12498,10 +11486,10 @@
                 <a:buNone/>
               </a:pPr>
               <a:r>
-                <a:rPr lang="en-US" sz="2000" dirty="0" smtClean="0"/>
-                <a:t>R1</a:t>
+                <a:rPr lang="en-US" dirty="0" smtClean="0"/>
+                <a:t>R2</a:t>
               </a:r>
-              <a:endParaRPr lang="en-US" sz="2000" dirty="0"/>
+              <a:endParaRPr lang="en-US" dirty="0"/>
             </a:p>
           </p:txBody>
         </p:sp>
@@ -12515,8 +11503,8 @@
           </p:nvSpPr>
           <p:spPr>
             <a:xfrm>
-              <a:off x="4169125" y="4000291"/>
-              <a:ext cx="562203" cy="260170"/>
+              <a:off x="4179775" y="3973426"/>
+              <a:ext cx="910261" cy="260170"/>
             </a:xfrm>
             <a:prstGeom prst="rect">
               <a:avLst/>
@@ -12696,16 +11684,16 @@
                 <a:buNone/>
               </a:pPr>
               <a:r>
-                <a:rPr lang="en-US" sz="2000" dirty="0" smtClean="0"/>
-                <a:t>R2</a:t>
+                <a:rPr lang="en-US" dirty="0" smtClean="0"/>
+                <a:t>R1</a:t>
               </a:r>
-              <a:endParaRPr lang="en-US" sz="2000" dirty="0"/>
+              <a:endParaRPr lang="en-US" dirty="0"/>
             </a:p>
           </p:txBody>
         </p:sp>
         <p:sp>
           <p:nvSpPr>
-            <p:cNvPr id="58" name="Content Placeholder 2"/>
+            <p:cNvPr id="61" name="Content Placeholder 2"/>
             <p:cNvSpPr txBox="1">
               <a:spLocks/>
             </p:cNvSpPr>
@@ -12713,8 +11701,8 @@
           </p:nvSpPr>
           <p:spPr>
             <a:xfrm>
-              <a:off x="4484952" y="4343726"/>
-              <a:ext cx="598106" cy="260170"/>
+              <a:off x="5856348" y="3334984"/>
+              <a:ext cx="678895" cy="260170"/>
             </a:xfrm>
             <a:prstGeom prst="rect">
               <a:avLst/>
@@ -12893,17 +11881,13 @@
                 <a:buFont typeface="Arial" panose="020B0604020202020204" pitchFamily="34" charset="0"/>
                 <a:buNone/>
               </a:pPr>
-              <a:r>
-                <a:rPr lang="en-US" sz="2000" dirty="0" smtClean="0"/>
-                <a:t>R3</a:t>
-              </a:r>
-              <a:endParaRPr lang="en-US" sz="2000" dirty="0"/>
+              <a:endParaRPr lang="en-US" dirty="0"/>
             </a:p>
           </p:txBody>
         </p:sp>
         <p:sp>
           <p:nvSpPr>
-            <p:cNvPr id="60" name="Content Placeholder 2"/>
+            <p:cNvPr id="62" name="Content Placeholder 2"/>
             <p:cNvSpPr txBox="1">
               <a:spLocks/>
             </p:cNvSpPr>
@@ -12911,8 +11895,8 @@
           </p:nvSpPr>
           <p:spPr>
             <a:xfrm>
-              <a:off x="4949139" y="4570383"/>
-              <a:ext cx="621683" cy="260170"/>
+              <a:off x="6659156" y="3523064"/>
+              <a:ext cx="776308" cy="260170"/>
             </a:xfrm>
             <a:prstGeom prst="rect">
               <a:avLst/>
@@ -13092,16 +12076,16 @@
                 <a:buNone/>
               </a:pPr>
               <a:r>
-                <a:rPr lang="en-US" sz="2000" dirty="0" smtClean="0"/>
+                <a:rPr lang="en-US" dirty="0" smtClean="0"/>
                 <a:t>R4</a:t>
               </a:r>
-              <a:endParaRPr lang="en-US" sz="2000" dirty="0"/>
+              <a:endParaRPr lang="en-US" dirty="0"/>
             </a:p>
           </p:txBody>
         </p:sp>
         <p:sp>
           <p:nvSpPr>
-            <p:cNvPr id="61" name="Content Placeholder 2"/>
+            <p:cNvPr id="63" name="Content Placeholder 2"/>
             <p:cNvSpPr txBox="1">
               <a:spLocks/>
             </p:cNvSpPr>
@@ -13109,8 +12093,8 @@
           </p:nvSpPr>
           <p:spPr>
             <a:xfrm>
-              <a:off x="5899272" y="3372662"/>
-              <a:ext cx="518701" cy="260170"/>
+              <a:off x="7228036" y="4045438"/>
+              <a:ext cx="755966" cy="260170"/>
             </a:xfrm>
             <a:prstGeom prst="rect">
               <a:avLst/>
@@ -13290,410 +12274,329 @@
                 <a:buNone/>
               </a:pPr>
               <a:r>
-                <a:rPr lang="en-US" sz="2000" dirty="0" smtClean="0"/>
+                <a:rPr lang="en-US" dirty="0" smtClean="0"/>
                 <a:t>R5</a:t>
               </a:r>
-              <a:endParaRPr lang="en-US" sz="2000" dirty="0"/>
-            </a:p>
-          </p:txBody>
-        </p:sp>
-        <p:sp>
-          <p:nvSpPr>
-            <p:cNvPr id="62" name="Content Placeholder 2"/>
-            <p:cNvSpPr txBox="1">
-              <a:spLocks/>
-            </p:cNvSpPr>
-            <p:nvPr/>
-          </p:nvSpPr>
-          <p:spPr>
-            <a:xfrm>
-              <a:off x="7335063" y="3792749"/>
-              <a:ext cx="605423" cy="260170"/>
-            </a:xfrm>
-            <a:prstGeom prst="rect">
-              <a:avLst/>
-            </a:prstGeom>
-          </p:spPr>
-          <p:txBody>
-            <a:bodyPr vert="horz" lIns="91440" tIns="45720" rIns="91440" bIns="45720" rtlCol="0">
-              <a:noAutofit/>
-            </a:bodyPr>
-            <a:lstStyle>
-              <a:lvl1pPr marL="228600" indent="-228600" algn="l" defTabSz="914400" rtl="0" eaLnBrk="1" latinLnBrk="0" hangingPunct="1">
-                <a:lnSpc>
-                  <a:spcPct val="90000"/>
-                </a:lnSpc>
-                <a:spcBef>
-                  <a:spcPts val="1000"/>
-                </a:spcBef>
-                <a:buFont typeface="Arial" panose="020B0604020202020204" pitchFamily="34" charset="0"/>
-                <a:buChar char="•"/>
-                <a:defRPr sz="2800" kern="1200">
-                  <a:solidFill>
-                    <a:schemeClr val="tx1"/>
-                  </a:solidFill>
-                  <a:latin typeface="+mn-lt"/>
-                  <a:ea typeface="+mn-ea"/>
-                  <a:cs typeface="+mn-cs"/>
-                </a:defRPr>
-              </a:lvl1pPr>
-              <a:lvl2pPr marL="685800" indent="-228600" algn="l" defTabSz="914400" rtl="0" eaLnBrk="1" latinLnBrk="0" hangingPunct="1">
-                <a:lnSpc>
-                  <a:spcPct val="90000"/>
-                </a:lnSpc>
-                <a:spcBef>
-                  <a:spcPts val="500"/>
-                </a:spcBef>
-                <a:buFont typeface="Arial" panose="020B0604020202020204" pitchFamily="34" charset="0"/>
-                <a:buChar char="•"/>
-                <a:defRPr sz="2400" kern="1200">
-                  <a:solidFill>
-                    <a:schemeClr val="tx1"/>
-                  </a:solidFill>
-                  <a:latin typeface="+mn-lt"/>
-                  <a:ea typeface="+mn-ea"/>
-                  <a:cs typeface="+mn-cs"/>
-                </a:defRPr>
-              </a:lvl2pPr>
-              <a:lvl3pPr marL="1143000" indent="-228600" algn="l" defTabSz="914400" rtl="0" eaLnBrk="1" latinLnBrk="0" hangingPunct="1">
-                <a:lnSpc>
-                  <a:spcPct val="90000"/>
-                </a:lnSpc>
-                <a:spcBef>
-                  <a:spcPts val="500"/>
-                </a:spcBef>
-                <a:buFont typeface="Arial" panose="020B0604020202020204" pitchFamily="34" charset="0"/>
-                <a:buChar char="•"/>
-                <a:defRPr sz="2000" kern="1200">
-                  <a:solidFill>
-                    <a:schemeClr val="tx1"/>
-                  </a:solidFill>
-                  <a:latin typeface="+mn-lt"/>
-                  <a:ea typeface="+mn-ea"/>
-                  <a:cs typeface="+mn-cs"/>
-                </a:defRPr>
-              </a:lvl3pPr>
-              <a:lvl4pPr marL="1600200" indent="-228600" algn="l" defTabSz="914400" rtl="0" eaLnBrk="1" latinLnBrk="0" hangingPunct="1">
-                <a:lnSpc>
-                  <a:spcPct val="90000"/>
-                </a:lnSpc>
-                <a:spcBef>
-                  <a:spcPts val="500"/>
-                </a:spcBef>
-                <a:buFont typeface="Arial" panose="020B0604020202020204" pitchFamily="34" charset="0"/>
-                <a:buChar char="•"/>
-                <a:defRPr sz="1800" kern="1200">
-                  <a:solidFill>
-                    <a:schemeClr val="tx1"/>
-                  </a:solidFill>
-                  <a:latin typeface="+mn-lt"/>
-                  <a:ea typeface="+mn-ea"/>
-                  <a:cs typeface="+mn-cs"/>
-                </a:defRPr>
-              </a:lvl4pPr>
-              <a:lvl5pPr marL="2057400" indent="-228600" algn="l" defTabSz="914400" rtl="0" eaLnBrk="1" latinLnBrk="0" hangingPunct="1">
-                <a:lnSpc>
-                  <a:spcPct val="90000"/>
-                </a:lnSpc>
-                <a:spcBef>
-                  <a:spcPts val="500"/>
-                </a:spcBef>
-                <a:buFont typeface="Arial" panose="020B0604020202020204" pitchFamily="34" charset="0"/>
-                <a:buChar char="•"/>
-                <a:defRPr sz="1800" kern="1200">
-                  <a:solidFill>
-                    <a:schemeClr val="tx1"/>
-                  </a:solidFill>
-                  <a:latin typeface="+mn-lt"/>
-                  <a:ea typeface="+mn-ea"/>
-                  <a:cs typeface="+mn-cs"/>
-                </a:defRPr>
-              </a:lvl5pPr>
-              <a:lvl6pPr marL="2514600" indent="-228600" algn="l" defTabSz="914400" rtl="0" eaLnBrk="1" latinLnBrk="0" hangingPunct="1">
-                <a:lnSpc>
-                  <a:spcPct val="90000"/>
-                </a:lnSpc>
-                <a:spcBef>
-                  <a:spcPts val="500"/>
-                </a:spcBef>
-                <a:buFont typeface="Arial" panose="020B0604020202020204" pitchFamily="34" charset="0"/>
-                <a:buChar char="•"/>
-                <a:defRPr sz="1800" kern="1200">
-                  <a:solidFill>
-                    <a:schemeClr val="tx1"/>
-                  </a:solidFill>
-                  <a:latin typeface="+mn-lt"/>
-                  <a:ea typeface="+mn-ea"/>
-                  <a:cs typeface="+mn-cs"/>
-                </a:defRPr>
-              </a:lvl6pPr>
-              <a:lvl7pPr marL="2971800" indent="-228600" algn="l" defTabSz="914400" rtl="0" eaLnBrk="1" latinLnBrk="0" hangingPunct="1">
-                <a:lnSpc>
-                  <a:spcPct val="90000"/>
-                </a:lnSpc>
-                <a:spcBef>
-                  <a:spcPts val="500"/>
-                </a:spcBef>
-                <a:buFont typeface="Arial" panose="020B0604020202020204" pitchFamily="34" charset="0"/>
-                <a:buChar char="•"/>
-                <a:defRPr sz="1800" kern="1200">
-                  <a:solidFill>
-                    <a:schemeClr val="tx1"/>
-                  </a:solidFill>
-                  <a:latin typeface="+mn-lt"/>
-                  <a:ea typeface="+mn-ea"/>
-                  <a:cs typeface="+mn-cs"/>
-                </a:defRPr>
-              </a:lvl7pPr>
-              <a:lvl8pPr marL="3429000" indent="-228600" algn="l" defTabSz="914400" rtl="0" eaLnBrk="1" latinLnBrk="0" hangingPunct="1">
-                <a:lnSpc>
-                  <a:spcPct val="90000"/>
-                </a:lnSpc>
-                <a:spcBef>
-                  <a:spcPts val="500"/>
-                </a:spcBef>
-                <a:buFont typeface="Arial" panose="020B0604020202020204" pitchFamily="34" charset="0"/>
-                <a:buChar char="•"/>
-                <a:defRPr sz="1800" kern="1200">
-                  <a:solidFill>
-                    <a:schemeClr val="tx1"/>
-                  </a:solidFill>
-                  <a:latin typeface="+mn-lt"/>
-                  <a:ea typeface="+mn-ea"/>
-                  <a:cs typeface="+mn-cs"/>
-                </a:defRPr>
-              </a:lvl8pPr>
-              <a:lvl9pPr marL="3886200" indent="-228600" algn="l" defTabSz="914400" rtl="0" eaLnBrk="1" latinLnBrk="0" hangingPunct="1">
-                <a:lnSpc>
-                  <a:spcPct val="90000"/>
-                </a:lnSpc>
-                <a:spcBef>
-                  <a:spcPts val="500"/>
-                </a:spcBef>
-                <a:buFont typeface="Arial" panose="020B0604020202020204" pitchFamily="34" charset="0"/>
-                <a:buChar char="•"/>
-                <a:defRPr sz="1800" kern="1200">
-                  <a:solidFill>
-                    <a:schemeClr val="tx1"/>
-                  </a:solidFill>
-                  <a:latin typeface="+mn-lt"/>
-                  <a:ea typeface="+mn-ea"/>
-                  <a:cs typeface="+mn-cs"/>
-                </a:defRPr>
-              </a:lvl9pPr>
-            </a:lstStyle>
-            <a:p>
-              <a:pPr marL="0" indent="0">
-                <a:buFont typeface="Arial" panose="020B0604020202020204" pitchFamily="34" charset="0"/>
-                <a:buNone/>
-              </a:pPr>
-              <a:r>
-                <a:rPr lang="en-US" sz="2000" dirty="0" smtClean="0"/>
-                <a:t>R6</a:t>
-              </a:r>
-              <a:endParaRPr lang="en-US" sz="2000" dirty="0"/>
-            </a:p>
-          </p:txBody>
-        </p:sp>
-        <p:sp>
-          <p:nvSpPr>
-            <p:cNvPr id="63" name="Content Placeholder 2"/>
-            <p:cNvSpPr txBox="1">
-              <a:spLocks/>
-            </p:cNvSpPr>
-            <p:nvPr/>
-          </p:nvSpPr>
-          <p:spPr>
-            <a:xfrm>
-              <a:off x="7297497" y="4316728"/>
-              <a:ext cx="620172" cy="260170"/>
-            </a:xfrm>
-            <a:prstGeom prst="rect">
-              <a:avLst/>
-            </a:prstGeom>
-          </p:spPr>
-          <p:txBody>
-            <a:bodyPr vert="horz" lIns="91440" tIns="45720" rIns="91440" bIns="45720" rtlCol="0">
-              <a:noAutofit/>
-            </a:bodyPr>
-            <a:lstStyle>
-              <a:lvl1pPr marL="228600" indent="-228600" algn="l" defTabSz="914400" rtl="0" eaLnBrk="1" latinLnBrk="0" hangingPunct="1">
-                <a:lnSpc>
-                  <a:spcPct val="90000"/>
-                </a:lnSpc>
-                <a:spcBef>
-                  <a:spcPts val="1000"/>
-                </a:spcBef>
-                <a:buFont typeface="Arial" panose="020B0604020202020204" pitchFamily="34" charset="0"/>
-                <a:buChar char="•"/>
-                <a:defRPr sz="2800" kern="1200">
-                  <a:solidFill>
-                    <a:schemeClr val="tx1"/>
-                  </a:solidFill>
-                  <a:latin typeface="+mn-lt"/>
-                  <a:ea typeface="+mn-ea"/>
-                  <a:cs typeface="+mn-cs"/>
-                </a:defRPr>
-              </a:lvl1pPr>
-              <a:lvl2pPr marL="685800" indent="-228600" algn="l" defTabSz="914400" rtl="0" eaLnBrk="1" latinLnBrk="0" hangingPunct="1">
-                <a:lnSpc>
-                  <a:spcPct val="90000"/>
-                </a:lnSpc>
-                <a:spcBef>
-                  <a:spcPts val="500"/>
-                </a:spcBef>
-                <a:buFont typeface="Arial" panose="020B0604020202020204" pitchFamily="34" charset="0"/>
-                <a:buChar char="•"/>
-                <a:defRPr sz="2400" kern="1200">
-                  <a:solidFill>
-                    <a:schemeClr val="tx1"/>
-                  </a:solidFill>
-                  <a:latin typeface="+mn-lt"/>
-                  <a:ea typeface="+mn-ea"/>
-                  <a:cs typeface="+mn-cs"/>
-                </a:defRPr>
-              </a:lvl2pPr>
-              <a:lvl3pPr marL="1143000" indent="-228600" algn="l" defTabSz="914400" rtl="0" eaLnBrk="1" latinLnBrk="0" hangingPunct="1">
-                <a:lnSpc>
-                  <a:spcPct val="90000"/>
-                </a:lnSpc>
-                <a:spcBef>
-                  <a:spcPts val="500"/>
-                </a:spcBef>
-                <a:buFont typeface="Arial" panose="020B0604020202020204" pitchFamily="34" charset="0"/>
-                <a:buChar char="•"/>
-                <a:defRPr sz="2000" kern="1200">
-                  <a:solidFill>
-                    <a:schemeClr val="tx1"/>
-                  </a:solidFill>
-                  <a:latin typeface="+mn-lt"/>
-                  <a:ea typeface="+mn-ea"/>
-                  <a:cs typeface="+mn-cs"/>
-                </a:defRPr>
-              </a:lvl3pPr>
-              <a:lvl4pPr marL="1600200" indent="-228600" algn="l" defTabSz="914400" rtl="0" eaLnBrk="1" latinLnBrk="0" hangingPunct="1">
-                <a:lnSpc>
-                  <a:spcPct val="90000"/>
-                </a:lnSpc>
-                <a:spcBef>
-                  <a:spcPts val="500"/>
-                </a:spcBef>
-                <a:buFont typeface="Arial" panose="020B0604020202020204" pitchFamily="34" charset="0"/>
-                <a:buChar char="•"/>
-                <a:defRPr sz="1800" kern="1200">
-                  <a:solidFill>
-                    <a:schemeClr val="tx1"/>
-                  </a:solidFill>
-                  <a:latin typeface="+mn-lt"/>
-                  <a:ea typeface="+mn-ea"/>
-                  <a:cs typeface="+mn-cs"/>
-                </a:defRPr>
-              </a:lvl4pPr>
-              <a:lvl5pPr marL="2057400" indent="-228600" algn="l" defTabSz="914400" rtl="0" eaLnBrk="1" latinLnBrk="0" hangingPunct="1">
-                <a:lnSpc>
-                  <a:spcPct val="90000"/>
-                </a:lnSpc>
-                <a:spcBef>
-                  <a:spcPts val="500"/>
-                </a:spcBef>
-                <a:buFont typeface="Arial" panose="020B0604020202020204" pitchFamily="34" charset="0"/>
-                <a:buChar char="•"/>
-                <a:defRPr sz="1800" kern="1200">
-                  <a:solidFill>
-                    <a:schemeClr val="tx1"/>
-                  </a:solidFill>
-                  <a:latin typeface="+mn-lt"/>
-                  <a:ea typeface="+mn-ea"/>
-                  <a:cs typeface="+mn-cs"/>
-                </a:defRPr>
-              </a:lvl5pPr>
-              <a:lvl6pPr marL="2514600" indent="-228600" algn="l" defTabSz="914400" rtl="0" eaLnBrk="1" latinLnBrk="0" hangingPunct="1">
-                <a:lnSpc>
-                  <a:spcPct val="90000"/>
-                </a:lnSpc>
-                <a:spcBef>
-                  <a:spcPts val="500"/>
-                </a:spcBef>
-                <a:buFont typeface="Arial" panose="020B0604020202020204" pitchFamily="34" charset="0"/>
-                <a:buChar char="•"/>
-                <a:defRPr sz="1800" kern="1200">
-                  <a:solidFill>
-                    <a:schemeClr val="tx1"/>
-                  </a:solidFill>
-                  <a:latin typeface="+mn-lt"/>
-                  <a:ea typeface="+mn-ea"/>
-                  <a:cs typeface="+mn-cs"/>
-                </a:defRPr>
-              </a:lvl6pPr>
-              <a:lvl7pPr marL="2971800" indent="-228600" algn="l" defTabSz="914400" rtl="0" eaLnBrk="1" latinLnBrk="0" hangingPunct="1">
-                <a:lnSpc>
-                  <a:spcPct val="90000"/>
-                </a:lnSpc>
-                <a:spcBef>
-                  <a:spcPts val="500"/>
-                </a:spcBef>
-                <a:buFont typeface="Arial" panose="020B0604020202020204" pitchFamily="34" charset="0"/>
-                <a:buChar char="•"/>
-                <a:defRPr sz="1800" kern="1200">
-                  <a:solidFill>
-                    <a:schemeClr val="tx1"/>
-                  </a:solidFill>
-                  <a:latin typeface="+mn-lt"/>
-                  <a:ea typeface="+mn-ea"/>
-                  <a:cs typeface="+mn-cs"/>
-                </a:defRPr>
-              </a:lvl7pPr>
-              <a:lvl8pPr marL="3429000" indent="-228600" algn="l" defTabSz="914400" rtl="0" eaLnBrk="1" latinLnBrk="0" hangingPunct="1">
-                <a:lnSpc>
-                  <a:spcPct val="90000"/>
-                </a:lnSpc>
-                <a:spcBef>
-                  <a:spcPts val="500"/>
-                </a:spcBef>
-                <a:buFont typeface="Arial" panose="020B0604020202020204" pitchFamily="34" charset="0"/>
-                <a:buChar char="•"/>
-                <a:defRPr sz="1800" kern="1200">
-                  <a:solidFill>
-                    <a:schemeClr val="tx1"/>
-                  </a:solidFill>
-                  <a:latin typeface="+mn-lt"/>
-                  <a:ea typeface="+mn-ea"/>
-                  <a:cs typeface="+mn-cs"/>
-                </a:defRPr>
-              </a:lvl8pPr>
-              <a:lvl9pPr marL="3886200" indent="-228600" algn="l" defTabSz="914400" rtl="0" eaLnBrk="1" latinLnBrk="0" hangingPunct="1">
-                <a:lnSpc>
-                  <a:spcPct val="90000"/>
-                </a:lnSpc>
-                <a:spcBef>
-                  <a:spcPts val="500"/>
-                </a:spcBef>
-                <a:buFont typeface="Arial" panose="020B0604020202020204" pitchFamily="34" charset="0"/>
-                <a:buChar char="•"/>
-                <a:defRPr sz="1800" kern="1200">
-                  <a:solidFill>
-                    <a:schemeClr val="tx1"/>
-                  </a:solidFill>
-                  <a:latin typeface="+mn-lt"/>
-                  <a:ea typeface="+mn-ea"/>
-                  <a:cs typeface="+mn-cs"/>
-                </a:defRPr>
-              </a:lvl9pPr>
-            </a:lstStyle>
-            <a:p>
-              <a:pPr marL="0" indent="0">
-                <a:buFont typeface="Arial" panose="020B0604020202020204" pitchFamily="34" charset="0"/>
-                <a:buNone/>
-              </a:pPr>
-              <a:r>
-                <a:rPr lang="en-US" sz="2000" dirty="0" smtClean="0"/>
-                <a:t>R7</a:t>
-              </a:r>
-              <a:endParaRPr lang="en-US" sz="2000" dirty="0"/>
+              <a:endParaRPr lang="en-US" dirty="0"/>
             </a:p>
           </p:txBody>
         </p:sp>
       </p:grpSp>
+      <p:sp>
+        <p:nvSpPr>
+          <p:cNvPr id="23" name="Freeform 22"/>
+          <p:cNvSpPr/>
+          <p:nvPr/>
+        </p:nvSpPr>
+        <p:spPr>
+          <a:xfrm>
+            <a:off x="1894089" y="1781678"/>
+            <a:ext cx="1388832" cy="586147"/>
+          </a:xfrm>
+          <a:custGeom>
+            <a:avLst/>
+            <a:gdLst>
+              <a:gd name="connsiteX0" fmla="*/ 0 w 1041400"/>
+              <a:gd name="connsiteY0" fmla="*/ 598311 h 598311"/>
+              <a:gd name="connsiteX1" fmla="*/ 419100 w 1041400"/>
+              <a:gd name="connsiteY1" fmla="*/ 39511 h 598311"/>
+              <a:gd name="connsiteX2" fmla="*/ 1041400 w 1041400"/>
+              <a:gd name="connsiteY2" fmla="*/ 90311 h 598311"/>
+              <a:gd name="connsiteX0" fmla="*/ 0 w 1089689"/>
+              <a:gd name="connsiteY0" fmla="*/ 586147 h 586147"/>
+              <a:gd name="connsiteX1" fmla="*/ 419100 w 1089689"/>
+              <a:gd name="connsiteY1" fmla="*/ 27347 h 586147"/>
+              <a:gd name="connsiteX2" fmla="*/ 1089689 w 1089689"/>
+              <a:gd name="connsiteY2" fmla="*/ 122109 h 586147"/>
+            </a:gdLst>
+            <a:ahLst/>
+            <a:cxnLst>
+              <a:cxn ang="0">
+                <a:pos x="connsiteX0" y="connsiteY0"/>
+              </a:cxn>
+              <a:cxn ang="0">
+                <a:pos x="connsiteX1" y="connsiteY1"/>
+              </a:cxn>
+              <a:cxn ang="0">
+                <a:pos x="connsiteX2" y="connsiteY2"/>
+              </a:cxn>
+            </a:cxnLst>
+            <a:rect l="l" t="t" r="r" b="b"/>
+            <a:pathLst>
+              <a:path w="1089689" h="586147">
+                <a:moveTo>
+                  <a:pt x="0" y="586147"/>
+                </a:moveTo>
+                <a:cubicBezTo>
+                  <a:pt x="122766" y="349080"/>
+                  <a:pt x="237485" y="104687"/>
+                  <a:pt x="419100" y="27347"/>
+                </a:cubicBezTo>
+                <a:cubicBezTo>
+                  <a:pt x="600715" y="-49993"/>
+                  <a:pt x="865322" y="54375"/>
+                  <a:pt x="1089689" y="122109"/>
+                </a:cubicBezTo>
+              </a:path>
+            </a:pathLst>
+          </a:custGeom>
+          <a:noFill/>
+          <a:ln w="28575">
+            <a:solidFill>
+              <a:schemeClr val="tx1"/>
+            </a:solidFill>
+          </a:ln>
+        </p:spPr>
+        <p:style>
+          <a:lnRef idx="2">
+            <a:schemeClr val="accent1">
+              <a:shade val="50000"/>
+            </a:schemeClr>
+          </a:lnRef>
+          <a:fillRef idx="1">
+            <a:schemeClr val="accent1"/>
+          </a:fillRef>
+          <a:effectRef idx="0">
+            <a:schemeClr val="accent1"/>
+          </a:effectRef>
+          <a:fontRef idx="minor">
+            <a:schemeClr val="lt1"/>
+          </a:fontRef>
+        </p:style>
+        <p:txBody>
+          <a:bodyPr rtlCol="0" anchor="ctr"/>
+          <a:lstStyle/>
+          <a:p>
+            <a:pPr algn="ctr"/>
+            <a:endParaRPr lang="en-US" sz="2800"/>
+          </a:p>
+        </p:txBody>
+      </p:sp>
+      <p:sp>
+        <p:nvSpPr>
+          <p:cNvPr id="4" name="Title 1"/>
+          <p:cNvSpPr txBox="1">
+            <a:spLocks/>
+          </p:cNvSpPr>
+          <p:nvPr/>
+        </p:nvSpPr>
+        <p:spPr>
+          <a:xfrm>
+            <a:off x="-7637" y="-44719"/>
+            <a:ext cx="6007995" cy="852891"/>
+          </a:xfrm>
+          <a:prstGeom prst="rect">
+            <a:avLst/>
+          </a:prstGeom>
+        </p:spPr>
+        <p:txBody>
+          <a:bodyPr vert="horz" lIns="91440" tIns="45720" rIns="91440" bIns="45720" rtlCol="0" anchor="b">
+            <a:normAutofit/>
+          </a:bodyPr>
+          <a:lstStyle>
+            <a:lvl1pPr algn="ctr" defTabSz="914400" rtl="0" eaLnBrk="1" latinLnBrk="0" hangingPunct="1">
+              <a:lnSpc>
+                <a:spcPct val="90000"/>
+              </a:lnSpc>
+              <a:spcBef>
+                <a:spcPct val="0"/>
+              </a:spcBef>
+              <a:buNone/>
+              <a:defRPr sz="6000" kern="1200">
+                <a:solidFill>
+                  <a:schemeClr val="tx1"/>
+                </a:solidFill>
+                <a:latin typeface="+mj-lt"/>
+                <a:ea typeface="+mj-ea"/>
+                <a:cs typeface="+mj-cs"/>
+              </a:defRPr>
+            </a:lvl1pPr>
+          </a:lstStyle>
+          <a:p>
+            <a:pPr algn="l"/>
+            <a:r>
+              <a:rPr lang="en-US" sz="4000" dirty="0" smtClean="0">
+                <a:solidFill>
+                  <a:schemeClr val="accent1">
+                    <a:lumMod val="50000"/>
+                  </a:schemeClr>
+                </a:solidFill>
+              </a:rPr>
+              <a:t>Example 1</a:t>
+            </a:r>
+            <a:endParaRPr lang="en-US" sz="4000" dirty="0">
+              <a:solidFill>
+                <a:schemeClr val="accent1">
+                  <a:lumMod val="50000"/>
+                </a:schemeClr>
+              </a:solidFill>
+            </a:endParaRPr>
+          </a:p>
+        </p:txBody>
+      </p:sp>
+      <p:sp>
+        <p:nvSpPr>
+          <p:cNvPr id="6" name="TextBox 5"/>
+          <p:cNvSpPr txBox="1"/>
+          <p:nvPr/>
+        </p:nvSpPr>
+        <p:spPr>
+          <a:xfrm>
+            <a:off x="5420328" y="2030161"/>
+            <a:ext cx="5610895" cy="2308324"/>
+          </a:xfrm>
+          <a:prstGeom prst="rect">
+            <a:avLst/>
+          </a:prstGeom>
+          <a:noFill/>
+        </p:spPr>
+        <p:txBody>
+          <a:bodyPr wrap="none" rtlCol="0">
+            <a:spAutoFit/>
+          </a:bodyPr>
+          <a:lstStyle/>
+          <a:p>
+            <a:pPr algn="ctr"/>
+            <a:r>
+              <a:rPr lang="en-US" sz="2400" b="1" dirty="0" smtClean="0"/>
+              <a:t>Policy</a:t>
+            </a:r>
+            <a:endParaRPr lang="en-US" sz="2400" b="1" dirty="0" smtClean="0"/>
+          </a:p>
+          <a:p>
+            <a:r>
+              <a:rPr lang="en-US" sz="2400" dirty="0" smtClean="0"/>
+              <a:t>P1. Prefer </a:t>
+            </a:r>
+            <a:r>
+              <a:rPr lang="en-US" sz="2400" dirty="0" err="1" smtClean="0"/>
+              <a:t>Cust</a:t>
+            </a:r>
+            <a:r>
+              <a:rPr lang="en-US" sz="2400" dirty="0" smtClean="0"/>
+              <a:t> </a:t>
+            </a:r>
+            <a:r>
+              <a:rPr lang="en-US" sz="2400" dirty="0" smtClean="0">
+                <a:sym typeface="Wingdings" panose="05000000000000000000" pitchFamily="2" charset="2"/>
+              </a:rPr>
+              <a:t>&gt;</a:t>
+            </a:r>
+            <a:r>
+              <a:rPr lang="en-US" sz="2400" dirty="0" smtClean="0"/>
+              <a:t> </a:t>
+            </a:r>
+            <a:r>
+              <a:rPr lang="en-US" sz="2400" dirty="0"/>
+              <a:t>Peer </a:t>
+            </a:r>
+            <a:r>
+              <a:rPr lang="en-US" sz="2400" dirty="0">
+                <a:sym typeface="Wingdings" panose="05000000000000000000" pitchFamily="2" charset="2"/>
+              </a:rPr>
+              <a:t>&gt;</a:t>
+            </a:r>
+            <a:r>
+              <a:rPr lang="en-US" sz="2400" dirty="0" smtClean="0"/>
+              <a:t> </a:t>
+            </a:r>
+            <a:r>
+              <a:rPr lang="en-US" sz="2400" dirty="0" err="1" smtClean="0"/>
+              <a:t>Prov</a:t>
+            </a:r>
+            <a:r>
+              <a:rPr lang="en-US" sz="2400" dirty="0"/>
+              <a:t> </a:t>
+            </a:r>
+          </a:p>
+          <a:p>
+            <a:r>
+              <a:rPr lang="en-US" sz="2400" dirty="0" smtClean="0"/>
+              <a:t>P2. Disallow </a:t>
+            </a:r>
+            <a:r>
+              <a:rPr lang="en-US" sz="2400" dirty="0"/>
+              <a:t>traffic between </a:t>
+            </a:r>
+            <a:r>
+              <a:rPr lang="en-US" sz="2400" dirty="0" err="1"/>
+              <a:t>Prov</a:t>
+            </a:r>
+            <a:r>
+              <a:rPr lang="en-US" sz="2400" dirty="0"/>
+              <a:t> and Peer</a:t>
+            </a:r>
+          </a:p>
+          <a:p>
+            <a:r>
+              <a:rPr lang="en-US" sz="2400" dirty="0" smtClean="0"/>
+              <a:t>P3. For </a:t>
+            </a:r>
+            <a:r>
+              <a:rPr lang="en-US" sz="2400" dirty="0" err="1" smtClean="0"/>
+              <a:t>Cust</a:t>
+            </a:r>
+            <a:r>
+              <a:rPr lang="en-US" sz="2400" dirty="0" smtClean="0"/>
+              <a:t>, prefer </a:t>
+            </a:r>
+            <a:r>
+              <a:rPr lang="en-US" sz="2400" dirty="0" smtClean="0"/>
+              <a:t>R1 </a:t>
+            </a:r>
+            <a:r>
+              <a:rPr lang="en-US" sz="2400" dirty="0"/>
+              <a:t>&gt;</a:t>
+            </a:r>
+            <a:r>
+              <a:rPr lang="en-US" sz="2400" dirty="0" smtClean="0"/>
+              <a:t> R2</a:t>
+            </a:r>
+          </a:p>
+          <a:p>
+            <a:r>
+              <a:rPr lang="en-US" sz="2400" dirty="0" smtClean="0"/>
+              <a:t>P4. </a:t>
+            </a:r>
+            <a:r>
+              <a:rPr lang="en-US" sz="2400" dirty="0" err="1" smtClean="0"/>
+              <a:t>Cust</a:t>
+            </a:r>
+            <a:r>
+              <a:rPr lang="en-US" sz="2400" dirty="0" smtClean="0"/>
+              <a:t> must be on path </a:t>
+            </a:r>
+            <a:r>
+              <a:rPr lang="en-US" sz="2400" dirty="0"/>
+              <a:t>for </a:t>
+            </a:r>
+            <a:r>
+              <a:rPr lang="en-US" sz="2400" dirty="0" smtClean="0"/>
+              <a:t>its prefixes</a:t>
+            </a:r>
+            <a:endParaRPr lang="en-US" sz="2400" dirty="0"/>
+          </a:p>
+          <a:p>
+            <a:r>
+              <a:rPr lang="en-US" sz="2400" dirty="0" smtClean="0"/>
+              <a:t>P5. </a:t>
+            </a:r>
+            <a:r>
+              <a:rPr lang="en-US" sz="2400" dirty="0" err="1" smtClean="0"/>
+              <a:t>Cust</a:t>
+            </a:r>
+            <a:r>
+              <a:rPr lang="en-US" sz="2400" dirty="0" smtClean="0"/>
+              <a:t> must not be a transit to </a:t>
+            </a:r>
+            <a:r>
+              <a:rPr lang="en-US" sz="2400" dirty="0" err="1" smtClean="0"/>
+              <a:t>Prov</a:t>
+            </a:r>
+            <a:endParaRPr lang="en-US" sz="2400" dirty="0"/>
+          </a:p>
+        </p:txBody>
+      </p:sp>
     </p:spTree>
     <p:extLst>
       <p:ext uri="{BB962C8B-B14F-4D97-AF65-F5344CB8AC3E}">
@@ -22935,144 +21838,448 @@
           </a:p>
         </p:txBody>
       </p:sp>
+      <p:sp>
+        <p:nvSpPr>
+          <p:cNvPr id="59" name="Rectangle 58"/>
+          <p:cNvSpPr/>
+          <p:nvPr/>
+        </p:nvSpPr>
+        <p:spPr>
+          <a:xfrm>
+            <a:off x="1164812" y="2369544"/>
+            <a:ext cx="385930" cy="326113"/>
+          </a:xfrm>
+          <a:prstGeom prst="rect">
+            <a:avLst/>
+          </a:prstGeom>
+          <a:solidFill>
+            <a:schemeClr val="bg2">
+              <a:lumMod val="90000"/>
+            </a:schemeClr>
+          </a:solidFill>
+          <a:ln>
+            <a:solidFill>
+              <a:schemeClr val="tx1"/>
+            </a:solidFill>
+          </a:ln>
+        </p:spPr>
+        <p:style>
+          <a:lnRef idx="2">
+            <a:schemeClr val="accent1">
+              <a:shade val="50000"/>
+            </a:schemeClr>
+          </a:lnRef>
+          <a:fillRef idx="1">
+            <a:schemeClr val="accent1"/>
+          </a:fillRef>
+          <a:effectRef idx="0">
+            <a:schemeClr val="accent1"/>
+          </a:effectRef>
+          <a:fontRef idx="minor">
+            <a:schemeClr val="lt1"/>
+          </a:fontRef>
+        </p:style>
+        <p:txBody>
+          <a:bodyPr rtlCol="0" anchor="ctr"/>
+          <a:lstStyle/>
+          <a:p>
+            <a:pPr algn="ctr"/>
+            <a:r>
+              <a:rPr lang="en-US" sz="2400" dirty="0" smtClean="0">
+                <a:solidFill>
+                  <a:schemeClr val="tx1"/>
+                </a:solidFill>
+              </a:rPr>
+              <a:t>X</a:t>
+            </a:r>
+            <a:endParaRPr lang="en-US" sz="2400" dirty="0">
+              <a:solidFill>
+                <a:schemeClr val="tx1"/>
+              </a:solidFill>
+            </a:endParaRPr>
+          </a:p>
+        </p:txBody>
+      </p:sp>
+      <p:sp>
+        <p:nvSpPr>
+          <p:cNvPr id="67" name="Rectangle 66"/>
+          <p:cNvSpPr/>
+          <p:nvPr/>
+        </p:nvSpPr>
+        <p:spPr>
+          <a:xfrm>
+            <a:off x="2743047" y="2375606"/>
+            <a:ext cx="385930" cy="326113"/>
+          </a:xfrm>
+          <a:prstGeom prst="rect">
+            <a:avLst/>
+          </a:prstGeom>
+          <a:solidFill>
+            <a:schemeClr val="bg2">
+              <a:lumMod val="90000"/>
+            </a:schemeClr>
+          </a:solidFill>
+          <a:ln>
+            <a:solidFill>
+              <a:schemeClr val="tx1"/>
+            </a:solidFill>
+          </a:ln>
+        </p:spPr>
+        <p:style>
+          <a:lnRef idx="2">
+            <a:schemeClr val="accent1">
+              <a:shade val="50000"/>
+            </a:schemeClr>
+          </a:lnRef>
+          <a:fillRef idx="1">
+            <a:schemeClr val="accent1"/>
+          </a:fillRef>
+          <a:effectRef idx="0">
+            <a:schemeClr val="accent1"/>
+          </a:effectRef>
+          <a:fontRef idx="minor">
+            <a:schemeClr val="lt1"/>
+          </a:fontRef>
+        </p:style>
+        <p:txBody>
+          <a:bodyPr rtlCol="0" anchor="ctr"/>
+          <a:lstStyle/>
+          <a:p>
+            <a:pPr algn="ctr"/>
+            <a:r>
+              <a:rPr lang="en-US" sz="2400" dirty="0" smtClean="0">
+                <a:solidFill>
+                  <a:schemeClr val="tx1"/>
+                </a:solidFill>
+              </a:rPr>
+              <a:t>Y</a:t>
+            </a:r>
+            <a:endParaRPr lang="en-US" sz="2400" dirty="0">
+              <a:solidFill>
+                <a:schemeClr val="tx1"/>
+              </a:solidFill>
+            </a:endParaRPr>
+          </a:p>
+        </p:txBody>
+      </p:sp>
+      <p:cxnSp>
+        <p:nvCxnSpPr>
+          <p:cNvPr id="115" name="Straight Connector 114"/>
+          <p:cNvCxnSpPr>
+            <a:stCxn id="59" idx="2"/>
+            <a:endCxn id="51" idx="0"/>
+          </p:cNvCxnSpPr>
+          <p:nvPr/>
+        </p:nvCxnSpPr>
+        <p:spPr>
+          <a:xfrm flipH="1">
+            <a:off x="884551" y="2695657"/>
+            <a:ext cx="473226" cy="607690"/>
+          </a:xfrm>
+          <a:prstGeom prst="line">
+            <a:avLst/>
+          </a:prstGeom>
+          <a:ln w="19050">
+            <a:solidFill>
+              <a:schemeClr val="tx1"/>
+            </a:solidFill>
+          </a:ln>
+        </p:spPr>
+        <p:style>
+          <a:lnRef idx="1">
+            <a:schemeClr val="accent1"/>
+          </a:lnRef>
+          <a:fillRef idx="0">
+            <a:schemeClr val="accent1"/>
+          </a:fillRef>
+          <a:effectRef idx="0">
+            <a:schemeClr val="accent1"/>
+          </a:effectRef>
+          <a:fontRef idx="minor">
+            <a:schemeClr val="tx1"/>
+          </a:fontRef>
+        </p:style>
+      </p:cxnSp>
+      <p:cxnSp>
+        <p:nvCxnSpPr>
+          <p:cNvPr id="116" name="Straight Connector 115"/>
+          <p:cNvCxnSpPr>
+            <a:stCxn id="67" idx="2"/>
+            <a:endCxn id="51" idx="0"/>
+          </p:cNvCxnSpPr>
+          <p:nvPr/>
+        </p:nvCxnSpPr>
+        <p:spPr>
+          <a:xfrm flipH="1">
+            <a:off x="884551" y="2701719"/>
+            <a:ext cx="2051461" cy="601628"/>
+          </a:xfrm>
+          <a:prstGeom prst="line">
+            <a:avLst/>
+          </a:prstGeom>
+          <a:ln w="19050">
+            <a:solidFill>
+              <a:schemeClr val="tx1"/>
+            </a:solidFill>
+          </a:ln>
+        </p:spPr>
+        <p:style>
+          <a:lnRef idx="1">
+            <a:schemeClr val="accent1"/>
+          </a:lnRef>
+          <a:fillRef idx="0">
+            <a:schemeClr val="accent1"/>
+          </a:fillRef>
+          <a:effectRef idx="0">
+            <a:schemeClr val="accent1"/>
+          </a:effectRef>
+          <a:fontRef idx="minor">
+            <a:schemeClr val="tx1"/>
+          </a:fontRef>
+        </p:style>
+      </p:cxnSp>
+      <p:cxnSp>
+        <p:nvCxnSpPr>
+          <p:cNvPr id="117" name="Straight Connector 116"/>
+          <p:cNvCxnSpPr>
+            <a:stCxn id="59" idx="2"/>
+            <a:endCxn id="52" idx="0"/>
+          </p:cNvCxnSpPr>
+          <p:nvPr/>
+        </p:nvCxnSpPr>
+        <p:spPr>
+          <a:xfrm>
+            <a:off x="1357777" y="2695657"/>
+            <a:ext cx="285325" cy="607690"/>
+          </a:xfrm>
+          <a:prstGeom prst="line">
+            <a:avLst/>
+          </a:prstGeom>
+          <a:ln w="19050">
+            <a:solidFill>
+              <a:schemeClr val="tx1"/>
+            </a:solidFill>
+          </a:ln>
+        </p:spPr>
+        <p:style>
+          <a:lnRef idx="1">
+            <a:schemeClr val="accent1"/>
+          </a:lnRef>
+          <a:fillRef idx="0">
+            <a:schemeClr val="accent1"/>
+          </a:fillRef>
+          <a:effectRef idx="0">
+            <a:schemeClr val="accent1"/>
+          </a:effectRef>
+          <a:fontRef idx="minor">
+            <a:schemeClr val="tx1"/>
+          </a:fontRef>
+        </p:style>
+      </p:cxnSp>
+      <p:cxnSp>
+        <p:nvCxnSpPr>
+          <p:cNvPr id="118" name="Straight Connector 117"/>
+          <p:cNvCxnSpPr>
+            <a:stCxn id="67" idx="2"/>
+            <a:endCxn id="114" idx="0"/>
+          </p:cNvCxnSpPr>
+          <p:nvPr/>
+        </p:nvCxnSpPr>
+        <p:spPr>
+          <a:xfrm>
+            <a:off x="2936012" y="2701719"/>
+            <a:ext cx="475758" cy="612406"/>
+          </a:xfrm>
+          <a:prstGeom prst="line">
+            <a:avLst/>
+          </a:prstGeom>
+          <a:ln w="19050">
+            <a:solidFill>
+              <a:schemeClr val="tx1"/>
+            </a:solidFill>
+          </a:ln>
+        </p:spPr>
+        <p:style>
+          <a:lnRef idx="1">
+            <a:schemeClr val="accent1"/>
+          </a:lnRef>
+          <a:fillRef idx="0">
+            <a:schemeClr val="accent1"/>
+          </a:fillRef>
+          <a:effectRef idx="0">
+            <a:schemeClr val="accent1"/>
+          </a:effectRef>
+          <a:fontRef idx="minor">
+            <a:schemeClr val="tx1"/>
+          </a:fontRef>
+        </p:style>
+      </p:cxnSp>
+      <p:cxnSp>
+        <p:nvCxnSpPr>
+          <p:cNvPr id="119" name="Straight Connector 118"/>
+          <p:cNvCxnSpPr>
+            <a:stCxn id="67" idx="2"/>
+            <a:endCxn id="113" idx="0"/>
+          </p:cNvCxnSpPr>
+          <p:nvPr/>
+        </p:nvCxnSpPr>
+        <p:spPr>
+          <a:xfrm flipH="1">
+            <a:off x="2653219" y="2701719"/>
+            <a:ext cx="282793" cy="612406"/>
+          </a:xfrm>
+          <a:prstGeom prst="line">
+            <a:avLst/>
+          </a:prstGeom>
+          <a:ln w="19050">
+            <a:solidFill>
+              <a:schemeClr val="tx1"/>
+            </a:solidFill>
+          </a:ln>
+        </p:spPr>
+        <p:style>
+          <a:lnRef idx="1">
+            <a:schemeClr val="accent1"/>
+          </a:lnRef>
+          <a:fillRef idx="0">
+            <a:schemeClr val="accent1"/>
+          </a:fillRef>
+          <a:effectRef idx="0">
+            <a:schemeClr val="accent1"/>
+          </a:effectRef>
+          <a:fontRef idx="minor">
+            <a:schemeClr val="tx1"/>
+          </a:fontRef>
+        </p:style>
+      </p:cxnSp>
+      <p:cxnSp>
+        <p:nvCxnSpPr>
+          <p:cNvPr id="120" name="Straight Connector 119"/>
+          <p:cNvCxnSpPr>
+            <a:stCxn id="67" idx="2"/>
+            <a:endCxn id="52" idx="0"/>
+          </p:cNvCxnSpPr>
+          <p:nvPr/>
+        </p:nvCxnSpPr>
+        <p:spPr>
+          <a:xfrm flipH="1">
+            <a:off x="1643102" y="2701719"/>
+            <a:ext cx="1292910" cy="601628"/>
+          </a:xfrm>
+          <a:prstGeom prst="line">
+            <a:avLst/>
+          </a:prstGeom>
+          <a:ln w="19050">
+            <a:solidFill>
+              <a:schemeClr val="tx1"/>
+            </a:solidFill>
+          </a:ln>
+        </p:spPr>
+        <p:style>
+          <a:lnRef idx="1">
+            <a:schemeClr val="accent1"/>
+          </a:lnRef>
+          <a:fillRef idx="0">
+            <a:schemeClr val="accent1"/>
+          </a:fillRef>
+          <a:effectRef idx="0">
+            <a:schemeClr val="accent1"/>
+          </a:effectRef>
+          <a:fontRef idx="minor">
+            <a:schemeClr val="tx1"/>
+          </a:fontRef>
+        </p:style>
+      </p:cxnSp>
+      <p:cxnSp>
+        <p:nvCxnSpPr>
+          <p:cNvPr id="121" name="Straight Connector 120"/>
+          <p:cNvCxnSpPr>
+            <a:stCxn id="59" idx="2"/>
+            <a:endCxn id="114" idx="0"/>
+          </p:cNvCxnSpPr>
+          <p:nvPr/>
+        </p:nvCxnSpPr>
+        <p:spPr>
+          <a:xfrm>
+            <a:off x="1357777" y="2695657"/>
+            <a:ext cx="2053993" cy="618468"/>
+          </a:xfrm>
+          <a:prstGeom prst="line">
+            <a:avLst/>
+          </a:prstGeom>
+          <a:ln w="19050">
+            <a:solidFill>
+              <a:schemeClr val="tx1"/>
+            </a:solidFill>
+          </a:ln>
+        </p:spPr>
+        <p:style>
+          <a:lnRef idx="1">
+            <a:schemeClr val="accent1"/>
+          </a:lnRef>
+          <a:fillRef idx="0">
+            <a:schemeClr val="accent1"/>
+          </a:fillRef>
+          <a:effectRef idx="0">
+            <a:schemeClr val="accent1"/>
+          </a:effectRef>
+          <a:fontRef idx="minor">
+            <a:schemeClr val="tx1"/>
+          </a:fontRef>
+        </p:style>
+      </p:cxnSp>
+      <p:cxnSp>
+        <p:nvCxnSpPr>
+          <p:cNvPr id="122" name="Straight Connector 121"/>
+          <p:cNvCxnSpPr>
+            <a:stCxn id="59" idx="2"/>
+            <a:endCxn id="113" idx="0"/>
+          </p:cNvCxnSpPr>
+          <p:nvPr/>
+        </p:nvCxnSpPr>
+        <p:spPr>
+          <a:xfrm>
+            <a:off x="1357777" y="2695657"/>
+            <a:ext cx="1295442" cy="618468"/>
+          </a:xfrm>
+          <a:prstGeom prst="line">
+            <a:avLst/>
+          </a:prstGeom>
+          <a:ln w="19050">
+            <a:solidFill>
+              <a:schemeClr val="tx1"/>
+            </a:solidFill>
+          </a:ln>
+        </p:spPr>
+        <p:style>
+          <a:lnRef idx="1">
+            <a:schemeClr val="accent1"/>
+          </a:lnRef>
+          <a:fillRef idx="0">
+            <a:schemeClr val="accent1"/>
+          </a:fillRef>
+          <a:effectRef idx="0">
+            <a:schemeClr val="accent1"/>
+          </a:effectRef>
+          <a:fontRef idx="minor">
+            <a:schemeClr val="tx1"/>
+          </a:fontRef>
+        </p:style>
+      </p:cxnSp>
       <p:grpSp>
         <p:nvGrpSpPr>
-          <p:cNvPr id="25" name="Group 24"/>
+          <p:cNvPr id="12" name="Group 11"/>
           <p:cNvGrpSpPr/>
           <p:nvPr/>
         </p:nvGrpSpPr>
         <p:grpSpPr>
           <a:xfrm>
-            <a:off x="3442215" y="2035629"/>
-            <a:ext cx="5116286" cy="3341914"/>
-            <a:chOff x="3181417" y="2231572"/>
-            <a:chExt cx="5116286" cy="3341914"/>
+            <a:off x="578496" y="3140061"/>
+            <a:ext cx="1367053" cy="1528912"/>
+            <a:chOff x="3494225" y="2201543"/>
+            <a:chExt cx="1367053" cy="1528912"/>
           </a:xfrm>
         </p:grpSpPr>
-        <p:sp>
-          <p:nvSpPr>
-            <p:cNvPr id="59" name="Rectangle 58"/>
-            <p:cNvSpPr/>
-            <p:nvPr/>
-          </p:nvSpPr>
-          <p:spPr>
-            <a:xfrm>
-              <a:off x="4422388" y="2231572"/>
-              <a:ext cx="631372" cy="620486"/>
-            </a:xfrm>
-            <a:prstGeom prst="rect">
-              <a:avLst/>
-            </a:prstGeom>
-            <a:solidFill>
-              <a:schemeClr val="bg2">
-                <a:lumMod val="90000"/>
-              </a:schemeClr>
-            </a:solidFill>
-            <a:ln>
-              <a:solidFill>
-                <a:schemeClr val="tx1"/>
-              </a:solidFill>
-            </a:ln>
-          </p:spPr>
-          <p:style>
-            <a:lnRef idx="2">
-              <a:schemeClr val="accent1">
-                <a:shade val="50000"/>
-              </a:schemeClr>
-            </a:lnRef>
-            <a:fillRef idx="1">
-              <a:schemeClr val="accent1"/>
-            </a:fillRef>
-            <a:effectRef idx="0">
-              <a:schemeClr val="accent1"/>
-            </a:effectRef>
-            <a:fontRef idx="minor">
-              <a:schemeClr val="lt1"/>
-            </a:fontRef>
-          </p:style>
-          <p:txBody>
-            <a:bodyPr rtlCol="0" anchor="ctr"/>
-            <a:lstStyle/>
-            <a:p>
-              <a:pPr algn="ctr"/>
-              <a:r>
-                <a:rPr lang="en-US" dirty="0" smtClean="0">
-                  <a:solidFill>
-                    <a:schemeClr val="tx1"/>
-                  </a:solidFill>
-                </a:rPr>
-                <a:t>X</a:t>
-              </a:r>
-              <a:endParaRPr lang="en-US" dirty="0">
-                <a:solidFill>
-                  <a:schemeClr val="tx1"/>
-                </a:solidFill>
-              </a:endParaRPr>
-            </a:p>
-          </p:txBody>
-        </p:sp>
-        <p:sp>
-          <p:nvSpPr>
-            <p:cNvPr id="67" name="Rectangle 66"/>
-            <p:cNvSpPr/>
-            <p:nvPr/>
-          </p:nvSpPr>
-          <p:spPr>
-            <a:xfrm>
-              <a:off x="6425360" y="2231572"/>
-              <a:ext cx="631372" cy="620486"/>
-            </a:xfrm>
-            <a:prstGeom prst="rect">
-              <a:avLst/>
-            </a:prstGeom>
-            <a:solidFill>
-              <a:schemeClr val="bg2">
-                <a:lumMod val="90000"/>
-              </a:schemeClr>
-            </a:solidFill>
-            <a:ln>
-              <a:solidFill>
-                <a:schemeClr val="tx1"/>
-              </a:solidFill>
-            </a:ln>
-          </p:spPr>
-          <p:style>
-            <a:lnRef idx="2">
-              <a:schemeClr val="accent1">
-                <a:shade val="50000"/>
-              </a:schemeClr>
-            </a:lnRef>
-            <a:fillRef idx="1">
-              <a:schemeClr val="accent1"/>
-            </a:fillRef>
-            <a:effectRef idx="0">
-              <a:schemeClr val="accent1"/>
-            </a:effectRef>
-            <a:fontRef idx="minor">
-              <a:schemeClr val="lt1"/>
-            </a:fontRef>
-          </p:style>
-          <p:txBody>
-            <a:bodyPr rtlCol="0" anchor="ctr"/>
-            <a:lstStyle/>
-            <a:p>
-              <a:pPr algn="ctr"/>
-              <a:r>
-                <a:rPr lang="en-US" dirty="0" smtClean="0">
-                  <a:solidFill>
-                    <a:schemeClr val="tx1"/>
-                  </a:solidFill>
-                </a:rPr>
-                <a:t>Y</a:t>
-              </a:r>
-              <a:endParaRPr lang="en-US" dirty="0">
-                <a:solidFill>
-                  <a:schemeClr val="tx1"/>
-                </a:solidFill>
-              </a:endParaRPr>
-            </a:p>
-          </p:txBody>
-        </p:sp>
         <p:grpSp>
           <p:nvGrpSpPr>
             <p:cNvPr id="13" name="Group 12"/>
@@ -23081,8 +22288,8 @@
           </p:nvGrpSpPr>
           <p:grpSpPr>
             <a:xfrm>
-              <a:off x="3181417" y="3788229"/>
-              <a:ext cx="1872343" cy="1785257"/>
+              <a:off x="3607315" y="2364829"/>
+              <a:ext cx="1144481" cy="938289"/>
               <a:chOff x="3181417" y="3788229"/>
               <a:chExt cx="1872343" cy="1785257"/>
             </a:xfrm>
@@ -23148,14 +22355,14 @@
                 <a:p>
                   <a:pPr algn="ctr"/>
                   <a:r>
-                    <a:rPr lang="en-US" dirty="0" smtClean="0">
+                    <a:rPr lang="en-US" sz="2400" dirty="0" smtClean="0">
                       <a:solidFill>
                         <a:schemeClr val="tx1"/>
                       </a:solidFill>
                     </a:rPr>
                     <a:t>A</a:t>
                   </a:r>
-                  <a:endParaRPr lang="en-US" dirty="0">
+                  <a:endParaRPr lang="en-US" sz="2400" dirty="0">
                     <a:solidFill>
                       <a:schemeClr val="tx1"/>
                     </a:solidFill>
@@ -23210,14 +22417,14 @@
                 <a:p>
                   <a:pPr algn="ctr"/>
                   <a:r>
-                    <a:rPr lang="en-US" dirty="0" smtClean="0">
+                    <a:rPr lang="en-US" sz="2400" dirty="0" smtClean="0">
                       <a:solidFill>
                         <a:schemeClr val="tx1"/>
                       </a:solidFill>
                     </a:rPr>
                     <a:t>B</a:t>
                   </a:r>
-                  <a:endParaRPr lang="en-US" dirty="0">
+                  <a:endParaRPr lang="en-US" sz="2400" dirty="0">
                     <a:solidFill>
                       <a:schemeClr val="tx1"/>
                     </a:solidFill>
@@ -23272,14 +22479,14 @@
                 <a:p>
                   <a:pPr algn="ctr"/>
                   <a:r>
-                    <a:rPr lang="en-US" dirty="0" smtClean="0">
+                    <a:rPr lang="en-US" sz="2400" dirty="0" smtClean="0">
                       <a:solidFill>
                         <a:schemeClr val="tx1"/>
                       </a:solidFill>
                     </a:rPr>
                     <a:t>C</a:t>
                   </a:r>
-                  <a:endParaRPr lang="en-US" dirty="0">
+                  <a:endParaRPr lang="en-US" sz="2400" dirty="0">
                     <a:solidFill>
                       <a:schemeClr val="tx1"/>
                     </a:solidFill>
@@ -23334,14 +22541,14 @@
                 <a:p>
                   <a:pPr algn="ctr"/>
                   <a:r>
-                    <a:rPr lang="en-US" dirty="0" smtClean="0">
+                    <a:rPr lang="en-US" sz="2400" dirty="0" smtClean="0">
                       <a:solidFill>
                         <a:schemeClr val="tx1"/>
                       </a:solidFill>
                     </a:rPr>
                     <a:t>D</a:t>
                   </a:r>
-                  <a:endParaRPr lang="en-US" dirty="0">
+                  <a:endParaRPr lang="en-US" sz="2400" dirty="0">
                     <a:solidFill>
                       <a:schemeClr val="tx1"/>
                     </a:solidFill>
@@ -23497,6 +22704,253 @@
             </p:style>
           </p:cxnSp>
         </p:grpSp>
+        <p:sp>
+          <p:nvSpPr>
+            <p:cNvPr id="5" name="TextBox 4"/>
+            <p:cNvSpPr txBox="1"/>
+            <p:nvPr/>
+          </p:nvSpPr>
+          <p:spPr>
+            <a:xfrm>
+              <a:off x="3542633" y="3242589"/>
+              <a:ext cx="559932" cy="461665"/>
+            </a:xfrm>
+            <a:prstGeom prst="rect">
+              <a:avLst/>
+            </a:prstGeom>
+            <a:noFill/>
+          </p:spPr>
+          <p:txBody>
+            <a:bodyPr wrap="square" rtlCol="0">
+              <a:spAutoFit/>
+            </a:bodyPr>
+            <a:lstStyle/>
+            <a:p>
+              <a:pPr algn="ctr"/>
+              <a:r>
+                <a:rPr lang="en-US" sz="2400" dirty="0" smtClean="0"/>
+                <a:t>P</a:t>
+              </a:r>
+              <a:r>
+                <a:rPr lang="en-US" sz="2400" baseline="-25000" dirty="0" smtClean="0"/>
+                <a:t>g1</a:t>
+              </a:r>
+              <a:endParaRPr lang="en-US" sz="2400" baseline="-25000" dirty="0"/>
+            </a:p>
+          </p:txBody>
+        </p:sp>
+        <p:sp>
+          <p:nvSpPr>
+            <p:cNvPr id="36" name="TextBox 35"/>
+            <p:cNvSpPr txBox="1"/>
+            <p:nvPr/>
+          </p:nvSpPr>
+          <p:spPr>
+            <a:xfrm>
+              <a:off x="4290324" y="3268790"/>
+              <a:ext cx="570954" cy="461665"/>
+            </a:xfrm>
+            <a:prstGeom prst="rect">
+              <a:avLst/>
+            </a:prstGeom>
+            <a:noFill/>
+          </p:spPr>
+          <p:txBody>
+            <a:bodyPr wrap="square" rtlCol="0">
+              <a:spAutoFit/>
+            </a:bodyPr>
+            <a:lstStyle/>
+            <a:p>
+              <a:pPr algn="ctr"/>
+              <a:r>
+                <a:rPr lang="en-US" sz="2400" dirty="0" smtClean="0"/>
+                <a:t>P</a:t>
+              </a:r>
+              <a:r>
+                <a:rPr lang="en-US" sz="2400" baseline="-25000" dirty="0" smtClean="0"/>
+                <a:t>g2</a:t>
+              </a:r>
+              <a:endParaRPr lang="en-US" sz="2400" baseline="-25000" dirty="0"/>
+            </a:p>
+          </p:txBody>
+        </p:sp>
+        <p:sp>
+          <p:nvSpPr>
+            <p:cNvPr id="6" name="Rectangle 5"/>
+            <p:cNvSpPr/>
+            <p:nvPr/>
+          </p:nvSpPr>
+          <p:spPr>
+            <a:xfrm>
+              <a:off x="3494225" y="2201543"/>
+              <a:ext cx="1350705" cy="1528912"/>
+            </a:xfrm>
+            <a:prstGeom prst="rect">
+              <a:avLst/>
+            </a:prstGeom>
+            <a:noFill/>
+            <a:ln>
+              <a:solidFill>
+                <a:schemeClr val="tx1"/>
+              </a:solidFill>
+              <a:prstDash val="dashDot"/>
+            </a:ln>
+          </p:spPr>
+          <p:style>
+            <a:lnRef idx="2">
+              <a:schemeClr val="accent1">
+                <a:shade val="50000"/>
+              </a:schemeClr>
+            </a:lnRef>
+            <a:fillRef idx="1">
+              <a:schemeClr val="accent1"/>
+            </a:fillRef>
+            <a:effectRef idx="0">
+              <a:schemeClr val="accent1"/>
+            </a:effectRef>
+            <a:fontRef idx="minor">
+              <a:schemeClr val="lt1"/>
+            </a:fontRef>
+          </p:style>
+          <p:txBody>
+            <a:bodyPr rtlCol="0" anchor="ctr"/>
+            <a:lstStyle/>
+            <a:p>
+              <a:pPr algn="ctr"/>
+              <a:endParaRPr lang="en-US"/>
+            </a:p>
+          </p:txBody>
+        </p:sp>
+      </p:grpSp>
+      <p:cxnSp>
+        <p:nvCxnSpPr>
+          <p:cNvPr id="46" name="Straight Connector 45"/>
+          <p:cNvCxnSpPr/>
+          <p:nvPr/>
+        </p:nvCxnSpPr>
+        <p:spPr>
+          <a:xfrm>
+            <a:off x="2941662" y="2044814"/>
+            <a:ext cx="0" cy="324730"/>
+          </a:xfrm>
+          <a:prstGeom prst="line">
+            <a:avLst/>
+          </a:prstGeom>
+          <a:ln w="38100">
+            <a:solidFill>
+              <a:schemeClr val="tx1"/>
+            </a:solidFill>
+            <a:headEnd type="triangle" w="med" len="med"/>
+            <a:tailEnd type="triangle" w="med" len="med"/>
+          </a:ln>
+        </p:spPr>
+        <p:style>
+          <a:lnRef idx="1">
+            <a:schemeClr val="accent1"/>
+          </a:lnRef>
+          <a:fillRef idx="0">
+            <a:schemeClr val="accent1"/>
+          </a:fillRef>
+          <a:effectRef idx="0">
+            <a:schemeClr val="accent1"/>
+          </a:effectRef>
+          <a:fontRef idx="minor">
+            <a:schemeClr val="tx1"/>
+          </a:fontRef>
+        </p:style>
+      </p:cxnSp>
+      <p:sp>
+        <p:nvSpPr>
+          <p:cNvPr id="47" name="TextBox 46"/>
+          <p:cNvSpPr txBox="1"/>
+          <p:nvPr/>
+        </p:nvSpPr>
+        <p:spPr>
+          <a:xfrm>
+            <a:off x="4170320" y="2336886"/>
+            <a:ext cx="4602744" cy="2354491"/>
+          </a:xfrm>
+          <a:prstGeom prst="rect">
+            <a:avLst/>
+          </a:prstGeom>
+          <a:noFill/>
+        </p:spPr>
+        <p:txBody>
+          <a:bodyPr wrap="square" rtlCol="0">
+            <a:spAutoFit/>
+          </a:bodyPr>
+          <a:lstStyle/>
+          <a:p>
+            <a:pPr algn="ctr"/>
+            <a:r>
+              <a:rPr lang="en-US" sz="2000" b="1" dirty="0" smtClean="0"/>
+              <a:t>Policy</a:t>
+            </a:r>
+          </a:p>
+          <a:p>
+            <a:r>
+              <a:rPr lang="en-US" sz="2000" dirty="0" smtClean="0"/>
+              <a:t>P1. Left cluster has global services with </a:t>
+            </a:r>
+            <a:r>
+              <a:rPr lang="en-US" sz="2000" dirty="0" err="1" smtClean="0"/>
+              <a:t>P</a:t>
+            </a:r>
+            <a:r>
+              <a:rPr lang="en-US" sz="2000" baseline="-25000" dirty="0" err="1" smtClean="0"/>
+              <a:t>g</a:t>
+            </a:r>
+            <a:r>
+              <a:rPr lang="en-US" sz="2000" baseline="-25000" dirty="0" smtClean="0"/>
+              <a:t>*</a:t>
+            </a:r>
+            <a:r>
+              <a:rPr lang="en-US" sz="2000" dirty="0" smtClean="0"/>
+              <a:t> prefixes, which should be announced externally as an aggregate </a:t>
+            </a:r>
+            <a:r>
+              <a:rPr lang="en-US" sz="2000" dirty="0"/>
+              <a:t>P</a:t>
+            </a:r>
+            <a:r>
+              <a:rPr lang="en-US" sz="2000" baseline="-25000" dirty="0"/>
+              <a:t>G </a:t>
+            </a:r>
+          </a:p>
+          <a:p>
+            <a:endParaRPr lang="en-US" sz="1050" baseline="-25000" dirty="0" smtClean="0"/>
+          </a:p>
+          <a:p>
+            <a:r>
+              <a:rPr lang="en-US" sz="2000" dirty="0" smtClean="0"/>
+              <a:t>P2. Right cluster has local services with P</a:t>
+            </a:r>
+            <a:r>
+              <a:rPr lang="en-US" sz="2000" baseline="-25000" dirty="0" smtClean="0"/>
+              <a:t>l*</a:t>
+            </a:r>
+            <a:r>
+              <a:rPr lang="en-US" sz="2000" dirty="0" smtClean="0"/>
+              <a:t> prefixes, which should not be announced externally</a:t>
+            </a:r>
+            <a:endParaRPr lang="en-US" sz="2000" dirty="0"/>
+          </a:p>
+        </p:txBody>
+      </p:sp>
+      <p:grpSp>
+        <p:nvGrpSpPr>
+          <p:cNvPr id="14" name="Group 13"/>
+          <p:cNvGrpSpPr/>
+          <p:nvPr/>
+        </p:nvGrpSpPr>
+        <p:grpSpPr>
+          <a:xfrm>
+            <a:off x="2339928" y="3150839"/>
+            <a:ext cx="1360691" cy="1529366"/>
+            <a:chOff x="6730932" y="2201543"/>
+            <a:chExt cx="1360691" cy="1529366"/>
+          </a:xfrm>
+        </p:grpSpPr>
         <p:grpSp>
           <p:nvGrpSpPr>
             <p:cNvPr id="105" name="Group 104"/>
@@ -23505,8 +22959,8 @@
           </p:nvGrpSpPr>
           <p:grpSpPr>
             <a:xfrm>
-              <a:off x="6425360" y="3788229"/>
-              <a:ext cx="1872343" cy="1785257"/>
+              <a:off x="6851258" y="2364829"/>
+              <a:ext cx="1144481" cy="938289"/>
               <a:chOff x="3181417" y="3788229"/>
               <a:chExt cx="1872343" cy="1785257"/>
             </a:xfrm>
@@ -23572,14 +23026,14 @@
                 <a:p>
                   <a:pPr algn="ctr"/>
                   <a:r>
-                    <a:rPr lang="en-US" dirty="0" smtClean="0">
+                    <a:rPr lang="en-US" sz="2400" dirty="0" smtClean="0">
                       <a:solidFill>
                         <a:schemeClr val="tx1"/>
                       </a:solidFill>
                     </a:rPr>
                     <a:t>E</a:t>
                   </a:r>
-                  <a:endParaRPr lang="en-US" dirty="0">
+                  <a:endParaRPr lang="en-US" sz="2400" dirty="0">
                     <a:solidFill>
                       <a:schemeClr val="tx1"/>
                     </a:solidFill>
@@ -23634,14 +23088,14 @@
                 <a:p>
                   <a:pPr algn="ctr"/>
                   <a:r>
-                    <a:rPr lang="en-US" dirty="0" smtClean="0">
+                    <a:rPr lang="en-US" sz="2400" dirty="0" smtClean="0">
                       <a:solidFill>
                         <a:schemeClr val="tx1"/>
                       </a:solidFill>
                     </a:rPr>
                     <a:t>F</a:t>
                   </a:r>
-                  <a:endParaRPr lang="en-US" dirty="0">
+                  <a:endParaRPr lang="en-US" sz="2400" dirty="0">
                     <a:solidFill>
                       <a:schemeClr val="tx1"/>
                     </a:solidFill>
@@ -23696,14 +23150,14 @@
                 <a:p>
                   <a:pPr algn="ctr"/>
                   <a:r>
-                    <a:rPr lang="en-US" dirty="0" smtClean="0">
+                    <a:rPr lang="en-US" sz="2400" dirty="0" smtClean="0">
                       <a:solidFill>
                         <a:schemeClr val="tx1"/>
                       </a:solidFill>
                     </a:rPr>
                     <a:t>G</a:t>
                   </a:r>
-                  <a:endParaRPr lang="en-US" dirty="0">
+                  <a:endParaRPr lang="en-US" sz="2400" dirty="0">
                     <a:solidFill>
                       <a:schemeClr val="tx1"/>
                     </a:solidFill>
@@ -23758,14 +23212,14 @@
                 <a:p>
                   <a:pPr algn="ctr"/>
                   <a:r>
-                    <a:rPr lang="en-US" dirty="0" smtClean="0">
+                    <a:rPr lang="en-US" sz="2400" dirty="0" smtClean="0">
                       <a:solidFill>
                         <a:schemeClr val="tx1"/>
                       </a:solidFill>
                     </a:rPr>
                     <a:t>H</a:t>
                   </a:r>
-                  <a:endParaRPr lang="en-US" dirty="0">
+                  <a:endParaRPr lang="en-US" sz="2400" dirty="0">
                     <a:solidFill>
                       <a:schemeClr val="tx1"/>
                     </a:solidFill>
@@ -23921,305 +23375,161 @@
             </p:style>
           </p:cxnSp>
         </p:grpSp>
-        <p:cxnSp>
-          <p:nvCxnSpPr>
-            <p:cNvPr id="115" name="Straight Connector 114"/>
-            <p:cNvCxnSpPr>
-              <a:stCxn id="59" idx="2"/>
-            </p:cNvCxnSpPr>
+        <p:sp>
+          <p:nvSpPr>
+            <p:cNvPr id="37" name="TextBox 36"/>
+            <p:cNvSpPr txBox="1"/>
             <p:nvPr/>
-          </p:nvCxnSpPr>
+          </p:nvSpPr>
           <p:spPr>
-            <a:xfrm flipH="1">
-              <a:off x="3502546" y="2852058"/>
-              <a:ext cx="1235528" cy="936170"/>
+            <a:xfrm>
+              <a:off x="6799884" y="3269244"/>
+              <a:ext cx="510840" cy="461665"/>
             </a:xfrm>
-            <a:prstGeom prst="line">
+            <a:prstGeom prst="rect">
               <a:avLst/>
             </a:prstGeom>
-            <a:ln w="19050">
+            <a:noFill/>
+          </p:spPr>
+          <p:txBody>
+            <a:bodyPr wrap="square" rtlCol="0">
+              <a:spAutoFit/>
+            </a:bodyPr>
+            <a:lstStyle/>
+            <a:p>
+              <a:pPr algn="ctr"/>
+              <a:r>
+                <a:rPr lang="en-US" sz="2400" dirty="0" smtClean="0"/>
+                <a:t>P</a:t>
+              </a:r>
+              <a:r>
+                <a:rPr lang="en-US" sz="2400" baseline="-25000" dirty="0" smtClean="0"/>
+                <a:t>l1</a:t>
+              </a:r>
+              <a:endParaRPr lang="en-US" sz="2400" baseline="-25000" dirty="0"/>
+            </a:p>
+          </p:txBody>
+        </p:sp>
+        <p:sp>
+          <p:nvSpPr>
+            <p:cNvPr id="38" name="TextBox 37"/>
+            <p:cNvSpPr txBox="1"/>
+            <p:nvPr/>
+          </p:nvSpPr>
+          <p:spPr>
+            <a:xfrm>
+              <a:off x="7568353" y="3268790"/>
+              <a:ext cx="523270" cy="461665"/>
+            </a:xfrm>
+            <a:prstGeom prst="rect">
+              <a:avLst/>
+            </a:prstGeom>
+            <a:noFill/>
+          </p:spPr>
+          <p:txBody>
+            <a:bodyPr wrap="square" rtlCol="0">
+              <a:spAutoFit/>
+            </a:bodyPr>
+            <a:lstStyle/>
+            <a:p>
+              <a:pPr algn="ctr"/>
+              <a:r>
+                <a:rPr lang="en-US" sz="2400" dirty="0" smtClean="0"/>
+                <a:t>P</a:t>
+              </a:r>
+              <a:r>
+                <a:rPr lang="en-US" sz="2400" baseline="-25000" dirty="0" smtClean="0"/>
+                <a:t>l2</a:t>
+              </a:r>
+              <a:endParaRPr lang="en-US" sz="2400" baseline="-25000" dirty="0"/>
+            </a:p>
+          </p:txBody>
+        </p:sp>
+        <p:sp>
+          <p:nvSpPr>
+            <p:cNvPr id="49" name="Rectangle 48"/>
+            <p:cNvSpPr/>
+            <p:nvPr/>
+          </p:nvSpPr>
+          <p:spPr>
+            <a:xfrm>
+              <a:off x="6730932" y="2201543"/>
+              <a:ext cx="1350705" cy="1528912"/>
+            </a:xfrm>
+            <a:prstGeom prst="rect">
+              <a:avLst/>
+            </a:prstGeom>
+            <a:noFill/>
+            <a:ln>
               <a:solidFill>
                 <a:schemeClr val="tx1"/>
               </a:solidFill>
+              <a:prstDash val="dashDot"/>
             </a:ln>
           </p:spPr>
           <p:style>
-            <a:lnRef idx="1">
-              <a:schemeClr val="accent1"/>
+            <a:lnRef idx="2">
+              <a:schemeClr val="accent1">
+                <a:shade val="50000"/>
+              </a:schemeClr>
             </a:lnRef>
-            <a:fillRef idx="0">
+            <a:fillRef idx="1">
               <a:schemeClr val="accent1"/>
             </a:fillRef>
             <a:effectRef idx="0">
               <a:schemeClr val="accent1"/>
             </a:effectRef>
             <a:fontRef idx="minor">
-              <a:schemeClr val="tx1"/>
+              <a:schemeClr val="lt1"/>
             </a:fontRef>
           </p:style>
-        </p:cxnSp>
-        <p:cxnSp>
-          <p:nvCxnSpPr>
-            <p:cNvPr id="116" name="Straight Connector 115"/>
-            <p:cNvCxnSpPr>
-              <a:stCxn id="67" idx="2"/>
-            </p:cNvCxnSpPr>
-            <p:nvPr/>
-          </p:nvCxnSpPr>
-          <p:spPr>
-            <a:xfrm flipH="1">
-              <a:off x="3497104" y="2852058"/>
-              <a:ext cx="3243942" cy="947056"/>
-            </a:xfrm>
-            <a:prstGeom prst="line">
-              <a:avLst/>
-            </a:prstGeom>
-            <a:ln w="19050">
-              <a:solidFill>
-                <a:schemeClr val="tx1"/>
-              </a:solidFill>
-            </a:ln>
-          </p:spPr>
-          <p:style>
-            <a:lnRef idx="1">
-              <a:schemeClr val="accent1"/>
-            </a:lnRef>
-            <a:fillRef idx="0">
-              <a:schemeClr val="accent1"/>
-            </a:fillRef>
-            <a:effectRef idx="0">
-              <a:schemeClr val="accent1"/>
-            </a:effectRef>
-            <a:fontRef idx="minor">
+          <p:txBody>
+            <a:bodyPr rtlCol="0" anchor="ctr"/>
+            <a:lstStyle/>
+            <a:p>
+              <a:pPr algn="ctr"/>
+              <a:endParaRPr lang="en-US"/>
+            </a:p>
+          </p:txBody>
+        </p:sp>
+      </p:grpSp>
+      <p:cxnSp>
+        <p:nvCxnSpPr>
+          <p:cNvPr id="64" name="Straight Connector 63"/>
+          <p:cNvCxnSpPr/>
+          <p:nvPr/>
+        </p:nvCxnSpPr>
+        <p:spPr>
+          <a:xfrm>
+            <a:off x="1374595" y="2058008"/>
+            <a:ext cx="0" cy="324730"/>
+          </a:xfrm>
+          <a:prstGeom prst="line">
+            <a:avLst/>
+          </a:prstGeom>
+          <a:ln w="38100">
+            <a:solidFill>
               <a:schemeClr val="tx1"/>
-            </a:fontRef>
-          </p:style>
-        </p:cxnSp>
-        <p:cxnSp>
-          <p:nvCxnSpPr>
-            <p:cNvPr id="117" name="Straight Connector 116"/>
-            <p:cNvCxnSpPr>
-              <a:stCxn id="59" idx="2"/>
-              <a:endCxn id="52" idx="0"/>
-            </p:cNvCxnSpPr>
-            <p:nvPr/>
-          </p:nvCxnSpPr>
-          <p:spPr>
-            <a:xfrm>
-              <a:off x="4738074" y="2852058"/>
-              <a:ext cx="0" cy="936171"/>
-            </a:xfrm>
-            <a:prstGeom prst="line">
-              <a:avLst/>
-            </a:prstGeom>
-            <a:ln w="19050">
-              <a:solidFill>
-                <a:schemeClr val="tx1"/>
-              </a:solidFill>
-            </a:ln>
-          </p:spPr>
-          <p:style>
-            <a:lnRef idx="1">
-              <a:schemeClr val="accent1"/>
-            </a:lnRef>
-            <a:fillRef idx="0">
-              <a:schemeClr val="accent1"/>
-            </a:fillRef>
-            <a:effectRef idx="0">
-              <a:schemeClr val="accent1"/>
-            </a:effectRef>
-            <a:fontRef idx="minor">
-              <a:schemeClr val="tx1"/>
-            </a:fontRef>
-          </p:style>
-        </p:cxnSp>
-        <p:cxnSp>
-          <p:nvCxnSpPr>
-            <p:cNvPr id="118" name="Straight Connector 117"/>
-            <p:cNvCxnSpPr>
-              <a:stCxn id="67" idx="2"/>
-            </p:cNvCxnSpPr>
-            <p:nvPr/>
-          </p:nvCxnSpPr>
-          <p:spPr>
-            <a:xfrm flipH="1">
-              <a:off x="4738075" y="2852058"/>
-              <a:ext cx="2002971" cy="925284"/>
-            </a:xfrm>
-            <a:prstGeom prst="line">
-              <a:avLst/>
-            </a:prstGeom>
-            <a:ln w="19050">
-              <a:solidFill>
-                <a:schemeClr val="tx1"/>
-              </a:solidFill>
-            </a:ln>
-          </p:spPr>
-          <p:style>
-            <a:lnRef idx="1">
-              <a:schemeClr val="accent1"/>
-            </a:lnRef>
-            <a:fillRef idx="0">
-              <a:schemeClr val="accent1"/>
-            </a:fillRef>
-            <a:effectRef idx="0">
-              <a:schemeClr val="accent1"/>
-            </a:effectRef>
-            <a:fontRef idx="minor">
-              <a:schemeClr val="tx1"/>
-            </a:fontRef>
-          </p:style>
-        </p:cxnSp>
-        <p:cxnSp>
-          <p:nvCxnSpPr>
-            <p:cNvPr id="119" name="Straight Connector 118"/>
-            <p:cNvCxnSpPr>
-              <a:stCxn id="67" idx="2"/>
-              <a:endCxn id="113" idx="0"/>
-            </p:cNvCxnSpPr>
-            <p:nvPr/>
-          </p:nvCxnSpPr>
-          <p:spPr>
-            <a:xfrm>
-              <a:off x="6741046" y="2852058"/>
-              <a:ext cx="0" cy="936171"/>
-            </a:xfrm>
-            <a:prstGeom prst="line">
-              <a:avLst/>
-            </a:prstGeom>
-            <a:ln w="19050">
-              <a:solidFill>
-                <a:schemeClr val="tx1"/>
-              </a:solidFill>
-            </a:ln>
-          </p:spPr>
-          <p:style>
-            <a:lnRef idx="1">
-              <a:schemeClr val="accent1"/>
-            </a:lnRef>
-            <a:fillRef idx="0">
-              <a:schemeClr val="accent1"/>
-            </a:fillRef>
-            <a:effectRef idx="0">
-              <a:schemeClr val="accent1"/>
-            </a:effectRef>
-            <a:fontRef idx="minor">
-              <a:schemeClr val="tx1"/>
-            </a:fontRef>
-          </p:style>
-        </p:cxnSp>
-        <p:cxnSp>
-          <p:nvCxnSpPr>
-            <p:cNvPr id="120" name="Straight Connector 119"/>
-            <p:cNvCxnSpPr>
-              <a:stCxn id="67" idx="2"/>
-            </p:cNvCxnSpPr>
-            <p:nvPr/>
-          </p:nvCxnSpPr>
-          <p:spPr>
-            <a:xfrm>
-              <a:off x="6741046" y="2852058"/>
-              <a:ext cx="1240971" cy="936171"/>
-            </a:xfrm>
-            <a:prstGeom prst="line">
-              <a:avLst/>
-            </a:prstGeom>
-            <a:ln w="19050">
-              <a:solidFill>
-                <a:schemeClr val="tx1"/>
-              </a:solidFill>
-            </a:ln>
-          </p:spPr>
-          <p:style>
-            <a:lnRef idx="1">
-              <a:schemeClr val="accent1"/>
-            </a:lnRef>
-            <a:fillRef idx="0">
-              <a:schemeClr val="accent1"/>
-            </a:fillRef>
-            <a:effectRef idx="0">
-              <a:schemeClr val="accent1"/>
-            </a:effectRef>
-            <a:fontRef idx="minor">
-              <a:schemeClr val="tx1"/>
-            </a:fontRef>
-          </p:style>
-        </p:cxnSp>
-        <p:cxnSp>
-          <p:nvCxnSpPr>
-            <p:cNvPr id="121" name="Straight Connector 120"/>
-            <p:cNvCxnSpPr>
-              <a:stCxn id="59" idx="2"/>
-            </p:cNvCxnSpPr>
-            <p:nvPr/>
-          </p:nvCxnSpPr>
-          <p:spPr>
-            <a:xfrm>
-              <a:off x="4738074" y="2852058"/>
-              <a:ext cx="3243943" cy="947056"/>
-            </a:xfrm>
-            <a:prstGeom prst="line">
-              <a:avLst/>
-            </a:prstGeom>
-            <a:ln w="19050">
-              <a:solidFill>
-                <a:schemeClr val="tx1"/>
-              </a:solidFill>
-            </a:ln>
-          </p:spPr>
-          <p:style>
-            <a:lnRef idx="1">
-              <a:schemeClr val="accent1"/>
-            </a:lnRef>
-            <a:fillRef idx="0">
-              <a:schemeClr val="accent1"/>
-            </a:fillRef>
-            <a:effectRef idx="0">
-              <a:schemeClr val="accent1"/>
-            </a:effectRef>
-            <a:fontRef idx="minor">
-              <a:schemeClr val="tx1"/>
-            </a:fontRef>
-          </p:style>
-        </p:cxnSp>
-        <p:cxnSp>
-          <p:nvCxnSpPr>
-            <p:cNvPr id="122" name="Straight Connector 121"/>
-            <p:cNvCxnSpPr>
-              <a:stCxn id="59" idx="2"/>
-            </p:cNvCxnSpPr>
-            <p:nvPr/>
-          </p:nvCxnSpPr>
-          <p:spPr>
-            <a:xfrm>
-              <a:off x="4738074" y="2852058"/>
-              <a:ext cx="2002972" cy="925284"/>
-            </a:xfrm>
-            <a:prstGeom prst="line">
-              <a:avLst/>
-            </a:prstGeom>
-            <a:ln w="19050">
-              <a:solidFill>
-                <a:schemeClr val="tx1"/>
-              </a:solidFill>
-            </a:ln>
-          </p:spPr>
-          <p:style>
-            <a:lnRef idx="1">
-              <a:schemeClr val="accent1"/>
-            </a:lnRef>
-            <a:fillRef idx="0">
-              <a:schemeClr val="accent1"/>
-            </a:fillRef>
-            <a:effectRef idx="0">
-              <a:schemeClr val="accent1"/>
-            </a:effectRef>
-            <a:fontRef idx="minor">
-              <a:schemeClr val="tx1"/>
-            </a:fontRef>
-          </p:style>
-        </p:cxnSp>
-      </p:grpSp>
+            </a:solidFill>
+            <a:headEnd type="triangle" w="med" len="med"/>
+            <a:tailEnd type="triangle" w="med" len="med"/>
+          </a:ln>
+        </p:spPr>
+        <p:style>
+          <a:lnRef idx="1">
+            <a:schemeClr val="accent1"/>
+          </a:lnRef>
+          <a:fillRef idx="0">
+            <a:schemeClr val="accent1"/>
+          </a:fillRef>
+          <a:effectRef idx="0">
+            <a:schemeClr val="accent1"/>
+          </a:effectRef>
+          <a:fontRef idx="minor">
+            <a:schemeClr val="tx1"/>
+          </a:fontRef>
+        </p:style>
+      </p:cxnSp>
     </p:spTree>
     <p:extLst>
       <p:ext uri="{BB962C8B-B14F-4D97-AF65-F5344CB8AC3E}">

</xml_diff>